<commit_message>
New version with supporting files
</commit_message>
<xml_diff>
--- a/powerpoint-slides.pptx
+++ b/powerpoint-slides.pptx
@@ -4,6 +4,9 @@
   <p:sldMasterIdLst>
     <p:sldMasterId id="2147483648" r:id="rId1"/>
   </p:sldMasterIdLst>
+  <p:notesMasterIdLst>
+    <p:notesMasterId r:id="rId18"/>
+  </p:notesMasterIdLst>
   <p:sldIdLst>
     <p:sldId id="256" r:id="rId2"/>
     <p:sldId id="257" r:id="rId3"/>
@@ -127,3001 +130,353 @@
 </p:presentation>
 </file>
 
-<file path=ppt/diagrams/colors1.xml><?xml version="1.0" encoding="utf-8"?>
-<dgm:colorsDef xmlns:dgm="http://schemas.openxmlformats.org/drawingml/2006/diagram" xmlns:a="http://schemas.openxmlformats.org/drawingml/2006/main" uniqueId="urn:microsoft.com/office/officeart/2005/8/colors/colorful2">
-  <dgm:title val=""/>
-  <dgm:desc val=""/>
-  <dgm:catLst>
-    <dgm:cat type="colorful" pri="10200"/>
-  </dgm:catLst>
-  <dgm:styleLbl name="node0">
-    <dgm:fillClrLst meth="repeat">
-      <a:schemeClr val="accent1"/>
-    </dgm:fillClrLst>
-    <dgm:linClrLst meth="repeat">
-      <a:schemeClr val="lt1"/>
-    </dgm:linClrLst>
-    <dgm:effectClrLst/>
-    <dgm:txLinClrLst/>
-    <dgm:txFillClrLst/>
-    <dgm:txEffectClrLst/>
-  </dgm:styleLbl>
-  <dgm:styleLbl name="node1">
-    <dgm:fillClrLst>
-      <a:schemeClr val="accent2"/>
-      <a:schemeClr val="accent3"/>
-    </dgm:fillClrLst>
-    <dgm:linClrLst meth="repeat">
-      <a:schemeClr val="lt1"/>
-    </dgm:linClrLst>
-    <dgm:effectClrLst/>
-    <dgm:txLinClrLst/>
-    <dgm:txFillClrLst/>
-    <dgm:txEffectClrLst/>
-  </dgm:styleLbl>
-  <dgm:styleLbl name="alignNode1">
-    <dgm:fillClrLst>
-      <a:schemeClr val="accent2"/>
-      <a:schemeClr val="accent3"/>
-    </dgm:fillClrLst>
-    <dgm:linClrLst>
-      <a:schemeClr val="accent2"/>
-      <a:schemeClr val="accent3"/>
-    </dgm:linClrLst>
-    <dgm:effectClrLst/>
-    <dgm:txLinClrLst/>
-    <dgm:txFillClrLst/>
-    <dgm:txEffectClrLst/>
-  </dgm:styleLbl>
-  <dgm:styleLbl name="lnNode1">
-    <dgm:fillClrLst>
-      <a:schemeClr val="accent2"/>
-      <a:schemeClr val="accent3"/>
-    </dgm:fillClrLst>
-    <dgm:linClrLst meth="repeat">
-      <a:schemeClr val="lt1"/>
-    </dgm:linClrLst>
-    <dgm:effectClrLst/>
-    <dgm:txLinClrLst/>
-    <dgm:txFillClrLst/>
-    <dgm:txEffectClrLst/>
-  </dgm:styleLbl>
-  <dgm:styleLbl name="vennNode1">
-    <dgm:fillClrLst>
-      <a:schemeClr val="accent2">
-        <a:alpha val="50000"/>
-      </a:schemeClr>
-      <a:schemeClr val="accent3">
-        <a:alpha val="50000"/>
-      </a:schemeClr>
-    </dgm:fillClrLst>
-    <dgm:linClrLst meth="repeat">
-      <a:schemeClr val="lt1"/>
-    </dgm:linClrLst>
-    <dgm:effectClrLst/>
-    <dgm:txLinClrLst/>
-    <dgm:txFillClrLst/>
-    <dgm:txEffectClrLst/>
-  </dgm:styleLbl>
-  <dgm:styleLbl name="node2">
-    <dgm:fillClrLst>
-      <a:schemeClr val="accent3"/>
-    </dgm:fillClrLst>
-    <dgm:linClrLst meth="repeat">
-      <a:schemeClr val="lt1"/>
-    </dgm:linClrLst>
-    <dgm:effectClrLst/>
-    <dgm:txLinClrLst/>
-    <dgm:txFillClrLst/>
-    <dgm:txEffectClrLst/>
-  </dgm:styleLbl>
-  <dgm:styleLbl name="node3">
-    <dgm:fillClrLst>
-      <a:schemeClr val="accent4"/>
-    </dgm:fillClrLst>
-    <dgm:linClrLst meth="repeat">
-      <a:schemeClr val="lt1"/>
-    </dgm:linClrLst>
-    <dgm:effectClrLst/>
-    <dgm:txLinClrLst/>
-    <dgm:txFillClrLst/>
-    <dgm:txEffectClrLst/>
-  </dgm:styleLbl>
-  <dgm:styleLbl name="node4">
-    <dgm:fillClrLst>
-      <a:schemeClr val="accent5"/>
-    </dgm:fillClrLst>
-    <dgm:linClrLst meth="repeat">
-      <a:schemeClr val="lt1"/>
-    </dgm:linClrLst>
-    <dgm:effectClrLst/>
-    <dgm:txLinClrLst/>
-    <dgm:txFillClrLst/>
-    <dgm:txEffectClrLst/>
-  </dgm:styleLbl>
-  <dgm:styleLbl name="fgImgPlace1">
-    <dgm:fillClrLst>
-      <a:schemeClr val="accent2">
-        <a:tint val="50000"/>
-      </a:schemeClr>
-      <a:schemeClr val="accent3">
-        <a:tint val="50000"/>
-      </a:schemeClr>
-    </dgm:fillClrLst>
-    <dgm:linClrLst meth="repeat">
-      <a:schemeClr val="lt1"/>
-    </dgm:linClrLst>
-    <dgm:effectClrLst/>
-    <dgm:txLinClrLst/>
-    <dgm:txFillClrLst meth="repeat">
-      <a:schemeClr val="lt1"/>
-    </dgm:txFillClrLst>
-    <dgm:txEffectClrLst/>
-  </dgm:styleLbl>
-  <dgm:styleLbl name="alignImgPlace1">
-    <dgm:fillClrLst>
-      <a:schemeClr val="accent2">
-        <a:tint val="50000"/>
-      </a:schemeClr>
-      <a:schemeClr val="accent3">
-        <a:tint val="20000"/>
-      </a:schemeClr>
-    </dgm:fillClrLst>
-    <dgm:linClrLst meth="repeat">
-      <a:schemeClr val="lt1"/>
-    </dgm:linClrLst>
-    <dgm:effectClrLst/>
-    <dgm:txLinClrLst/>
-    <dgm:txFillClrLst meth="repeat">
-      <a:schemeClr val="lt1"/>
-    </dgm:txFillClrLst>
-    <dgm:txEffectClrLst/>
-  </dgm:styleLbl>
-  <dgm:styleLbl name="bgImgPlace1">
-    <dgm:fillClrLst>
-      <a:schemeClr val="accent2">
-        <a:tint val="50000"/>
-      </a:schemeClr>
-      <a:schemeClr val="accent3">
-        <a:tint val="20000"/>
-      </a:schemeClr>
-    </dgm:fillClrLst>
-    <dgm:linClrLst meth="repeat">
-      <a:schemeClr val="lt1"/>
-    </dgm:linClrLst>
-    <dgm:effectClrLst/>
-    <dgm:txLinClrLst/>
-    <dgm:txFillClrLst meth="repeat">
-      <a:schemeClr val="lt1"/>
-    </dgm:txFillClrLst>
-    <dgm:txEffectClrLst/>
-  </dgm:styleLbl>
-  <dgm:styleLbl name="sibTrans2D1">
-    <dgm:fillClrLst>
-      <a:schemeClr val="accent2"/>
-      <a:schemeClr val="accent3"/>
-    </dgm:fillClrLst>
-    <dgm:linClrLst meth="repeat">
-      <a:schemeClr val="lt1"/>
-    </dgm:linClrLst>
-    <dgm:effectClrLst/>
-    <dgm:txLinClrLst/>
-    <dgm:txFillClrLst/>
-    <dgm:txEffectClrLst/>
-  </dgm:styleLbl>
-  <dgm:styleLbl name="fgSibTrans2D1">
-    <dgm:fillClrLst>
-      <a:schemeClr val="accent2"/>
-      <a:schemeClr val="accent3"/>
-    </dgm:fillClrLst>
-    <dgm:linClrLst meth="repeat">
-      <a:schemeClr val="lt1"/>
-    </dgm:linClrLst>
-    <dgm:effectClrLst/>
-    <dgm:txLinClrLst/>
-    <dgm:txFillClrLst meth="repeat">
-      <a:schemeClr val="lt1"/>
-    </dgm:txFillClrLst>
-    <dgm:txEffectClrLst/>
-  </dgm:styleLbl>
-  <dgm:styleLbl name="bgSibTrans2D1">
-    <dgm:fillClrLst>
-      <a:schemeClr val="accent2"/>
-      <a:schemeClr val="accent3"/>
-    </dgm:fillClrLst>
-    <dgm:linClrLst meth="repeat">
-      <a:schemeClr val="lt1"/>
-    </dgm:linClrLst>
-    <dgm:effectClrLst/>
-    <dgm:txLinClrLst/>
-    <dgm:txFillClrLst meth="repeat">
-      <a:schemeClr val="lt1"/>
-    </dgm:txFillClrLst>
-    <dgm:txEffectClrLst/>
-  </dgm:styleLbl>
-  <dgm:styleLbl name="sibTrans1D1">
-    <dgm:fillClrLst/>
-    <dgm:linClrLst>
-      <a:schemeClr val="accent2"/>
-      <a:schemeClr val="accent3"/>
-    </dgm:linClrLst>
-    <dgm:effectClrLst/>
-    <dgm:txLinClrLst/>
-    <dgm:txFillClrLst meth="repeat">
-      <a:schemeClr val="tx1"/>
-    </dgm:txFillClrLst>
-    <dgm:txEffectClrLst/>
-  </dgm:styleLbl>
-  <dgm:styleLbl name="callout">
-    <dgm:fillClrLst meth="repeat">
-      <a:schemeClr val="accent2"/>
-    </dgm:fillClrLst>
-    <dgm:linClrLst meth="repeat">
-      <a:schemeClr val="accent2">
-        <a:tint val="50000"/>
-      </a:schemeClr>
-    </dgm:linClrLst>
-    <dgm:effectClrLst/>
-    <dgm:txLinClrLst/>
-    <dgm:txFillClrLst meth="repeat">
-      <a:schemeClr val="tx1"/>
-    </dgm:txFillClrLst>
-    <dgm:txEffectClrLst/>
-  </dgm:styleLbl>
-  <dgm:styleLbl name="asst0">
-    <dgm:fillClrLst meth="repeat">
-      <a:schemeClr val="accent2"/>
-    </dgm:fillClrLst>
-    <dgm:linClrLst meth="repeat">
-      <a:schemeClr val="lt1">
-        <a:shade val="80000"/>
-      </a:schemeClr>
-    </dgm:linClrLst>
-    <dgm:effectClrLst/>
-    <dgm:txLinClrLst/>
-    <dgm:txFillClrLst/>
-    <dgm:txEffectClrLst/>
-  </dgm:styleLbl>
-  <dgm:styleLbl name="asst1">
-    <dgm:fillClrLst meth="repeat">
-      <a:schemeClr val="accent3"/>
-    </dgm:fillClrLst>
-    <dgm:linClrLst meth="repeat">
-      <a:schemeClr val="lt1">
-        <a:shade val="80000"/>
-      </a:schemeClr>
-    </dgm:linClrLst>
-    <dgm:effectClrLst/>
-    <dgm:txLinClrLst/>
-    <dgm:txFillClrLst/>
-    <dgm:txEffectClrLst/>
-  </dgm:styleLbl>
-  <dgm:styleLbl name="asst2">
-    <dgm:fillClrLst>
-      <a:schemeClr val="accent4"/>
-    </dgm:fillClrLst>
-    <dgm:linClrLst meth="repeat">
-      <a:schemeClr val="lt1"/>
-    </dgm:linClrLst>
-    <dgm:effectClrLst/>
-    <dgm:txLinClrLst/>
-    <dgm:txFillClrLst/>
-    <dgm:txEffectClrLst/>
-  </dgm:styleLbl>
-  <dgm:styleLbl name="asst3">
-    <dgm:fillClrLst>
-      <a:schemeClr val="accent5"/>
-    </dgm:fillClrLst>
-    <dgm:linClrLst meth="repeat">
-      <a:schemeClr val="lt1"/>
-    </dgm:linClrLst>
-    <dgm:effectClrLst/>
-    <dgm:txLinClrLst/>
-    <dgm:txFillClrLst/>
-    <dgm:txEffectClrLst/>
-  </dgm:styleLbl>
-  <dgm:styleLbl name="asst4">
-    <dgm:fillClrLst>
-      <a:schemeClr val="accent6"/>
-    </dgm:fillClrLst>
-    <dgm:linClrLst meth="repeat">
-      <a:schemeClr val="lt1"/>
-    </dgm:linClrLst>
-    <dgm:effectClrLst/>
-    <dgm:txLinClrLst/>
-    <dgm:txFillClrLst/>
-    <dgm:txEffectClrLst/>
-  </dgm:styleLbl>
-  <dgm:styleLbl name="parChTrans2D1">
-    <dgm:fillClrLst meth="repeat">
-      <a:schemeClr val="accent2"/>
-    </dgm:fillClrLst>
-    <dgm:linClrLst meth="repeat">
-      <a:schemeClr val="lt1"/>
-    </dgm:linClrLst>
-    <dgm:effectClrLst/>
-    <dgm:txLinClrLst/>
-    <dgm:txFillClrLst meth="repeat">
-      <a:schemeClr val="lt1"/>
-    </dgm:txFillClrLst>
-    <dgm:txEffectClrLst/>
-  </dgm:styleLbl>
-  <dgm:styleLbl name="parChTrans2D2">
-    <dgm:fillClrLst meth="repeat">
-      <a:schemeClr val="accent3"/>
-    </dgm:fillClrLst>
-    <dgm:linClrLst meth="repeat">
-      <a:schemeClr val="lt1"/>
-    </dgm:linClrLst>
-    <dgm:effectClrLst/>
-    <dgm:txLinClrLst/>
-    <dgm:txFillClrLst/>
-    <dgm:txEffectClrLst/>
-  </dgm:styleLbl>
-  <dgm:styleLbl name="parChTrans2D3">
-    <dgm:fillClrLst meth="repeat">
-      <a:schemeClr val="accent4"/>
-    </dgm:fillClrLst>
-    <dgm:linClrLst meth="repeat">
-      <a:schemeClr val="lt1"/>
-    </dgm:linClrLst>
-    <dgm:effectClrLst/>
-    <dgm:txLinClrLst/>
-    <dgm:txFillClrLst/>
-    <dgm:txEffectClrLst/>
-  </dgm:styleLbl>
-  <dgm:styleLbl name="parChTrans2D4">
-    <dgm:fillClrLst meth="repeat">
-      <a:schemeClr val="accent5"/>
-    </dgm:fillClrLst>
-    <dgm:linClrLst meth="repeat">
-      <a:schemeClr val="lt1"/>
-    </dgm:linClrLst>
-    <dgm:effectClrLst/>
-    <dgm:txLinClrLst/>
-    <dgm:txFillClrLst meth="repeat">
-      <a:schemeClr val="lt1"/>
-    </dgm:txFillClrLst>
-    <dgm:txEffectClrLst/>
-  </dgm:styleLbl>
-  <dgm:styleLbl name="parChTrans1D1">
-    <dgm:fillClrLst meth="repeat">
-      <a:schemeClr val="accent2"/>
-    </dgm:fillClrLst>
-    <dgm:linClrLst meth="repeat">
-      <a:schemeClr val="accent2"/>
-    </dgm:linClrLst>
-    <dgm:effectClrLst/>
-    <dgm:txLinClrLst/>
-    <dgm:txFillClrLst meth="repeat">
-      <a:schemeClr val="tx1"/>
-    </dgm:txFillClrLst>
-    <dgm:txEffectClrLst/>
-  </dgm:styleLbl>
-  <dgm:styleLbl name="parChTrans1D2">
-    <dgm:fillClrLst meth="repeat">
-      <a:schemeClr val="accent2">
-        <a:tint val="90000"/>
-      </a:schemeClr>
-    </dgm:fillClrLst>
-    <dgm:linClrLst meth="repeat">
-      <a:schemeClr val="accent3"/>
-    </dgm:linClrLst>
-    <dgm:effectClrLst/>
-    <dgm:txLinClrLst/>
-    <dgm:txFillClrLst meth="repeat">
-      <a:schemeClr val="tx1"/>
-    </dgm:txFillClrLst>
-    <dgm:txEffectClrLst/>
-  </dgm:styleLbl>
-  <dgm:styleLbl name="parChTrans1D3">
-    <dgm:fillClrLst meth="repeat">
-      <a:schemeClr val="accent2">
-        <a:tint val="70000"/>
-      </a:schemeClr>
-    </dgm:fillClrLst>
-    <dgm:linClrLst meth="repeat">
-      <a:schemeClr val="accent4"/>
-    </dgm:linClrLst>
-    <dgm:effectClrLst/>
-    <dgm:txLinClrLst/>
-    <dgm:txFillClrLst meth="repeat">
-      <a:schemeClr val="tx1"/>
-    </dgm:txFillClrLst>
-    <dgm:txEffectClrLst/>
-  </dgm:styleLbl>
-  <dgm:styleLbl name="parChTrans1D4">
-    <dgm:fillClrLst meth="repeat">
-      <a:schemeClr val="accent2">
-        <a:tint val="50000"/>
-      </a:schemeClr>
-    </dgm:fillClrLst>
-    <dgm:linClrLst meth="repeat">
-      <a:schemeClr val="accent5"/>
-    </dgm:linClrLst>
-    <dgm:effectClrLst/>
-    <dgm:txLinClrLst/>
-    <dgm:txFillClrLst meth="repeat">
-      <a:schemeClr val="tx1"/>
-    </dgm:txFillClrLst>
-    <dgm:txEffectClrLst/>
-  </dgm:styleLbl>
-  <dgm:styleLbl name="fgAcc1">
-    <dgm:fillClrLst meth="repeat">
-      <a:schemeClr val="lt1">
-        <a:alpha val="90000"/>
-      </a:schemeClr>
-    </dgm:fillClrLst>
-    <dgm:linClrLst>
-      <a:schemeClr val="accent2"/>
-      <a:schemeClr val="accent3"/>
-    </dgm:linClrLst>
-    <dgm:effectClrLst/>
-    <dgm:txLinClrLst/>
-    <dgm:txFillClrLst meth="repeat">
-      <a:schemeClr val="dk1"/>
-    </dgm:txFillClrLst>
-    <dgm:txEffectClrLst/>
-  </dgm:styleLbl>
-  <dgm:styleLbl name="conFgAcc1">
-    <dgm:fillClrLst meth="repeat">
-      <a:schemeClr val="lt1">
-        <a:alpha val="90000"/>
-      </a:schemeClr>
-    </dgm:fillClrLst>
-    <dgm:linClrLst>
-      <a:schemeClr val="accent2"/>
-      <a:schemeClr val="accent3"/>
-    </dgm:linClrLst>
-    <dgm:effectClrLst/>
-    <dgm:txLinClrLst/>
-    <dgm:txFillClrLst meth="repeat">
-      <a:schemeClr val="dk1"/>
-    </dgm:txFillClrLst>
-    <dgm:txEffectClrLst/>
-  </dgm:styleLbl>
-  <dgm:styleLbl name="alignAcc1">
-    <dgm:fillClrLst meth="repeat">
-      <a:schemeClr val="lt1">
-        <a:alpha val="90000"/>
-      </a:schemeClr>
-    </dgm:fillClrLst>
-    <dgm:linClrLst>
-      <a:schemeClr val="accent2"/>
-      <a:schemeClr val="accent3"/>
-    </dgm:linClrLst>
-    <dgm:effectClrLst/>
-    <dgm:txLinClrLst/>
-    <dgm:txFillClrLst meth="repeat">
-      <a:schemeClr val="dk1"/>
-    </dgm:txFillClrLst>
-    <dgm:txEffectClrLst/>
-  </dgm:styleLbl>
-  <dgm:styleLbl name="trAlignAcc1">
-    <dgm:fillClrLst meth="repeat">
-      <a:schemeClr val="lt1">
-        <a:alpha val="40000"/>
-      </a:schemeClr>
-    </dgm:fillClrLst>
-    <dgm:linClrLst meth="repeat">
-      <a:schemeClr val="accent2"/>
-    </dgm:linClrLst>
-    <dgm:effectClrLst/>
-    <dgm:txLinClrLst/>
-    <dgm:txFillClrLst meth="repeat">
-      <a:schemeClr val="dk1"/>
-    </dgm:txFillClrLst>
-    <dgm:txEffectClrLst/>
-  </dgm:styleLbl>
-  <dgm:styleLbl name="bgAcc1">
-    <dgm:fillClrLst meth="repeat">
-      <a:schemeClr val="lt1">
-        <a:alpha val="90000"/>
-      </a:schemeClr>
-    </dgm:fillClrLst>
-    <dgm:linClrLst>
-      <a:schemeClr val="accent2"/>
-      <a:schemeClr val="accent3"/>
-    </dgm:linClrLst>
-    <dgm:effectClrLst/>
-    <dgm:txLinClrLst/>
-    <dgm:txFillClrLst meth="repeat">
-      <a:schemeClr val="dk1"/>
-    </dgm:txFillClrLst>
-    <dgm:txEffectClrLst/>
-  </dgm:styleLbl>
-  <dgm:styleLbl name="solidFgAcc1">
-    <dgm:fillClrLst meth="repeat">
-      <a:schemeClr val="lt1"/>
-    </dgm:fillClrLst>
-    <dgm:linClrLst>
-      <a:schemeClr val="accent2"/>
-      <a:schemeClr val="accent3"/>
-    </dgm:linClrLst>
-    <dgm:effectClrLst/>
-    <dgm:txLinClrLst/>
-    <dgm:txFillClrLst meth="repeat">
-      <a:schemeClr val="dk1"/>
-    </dgm:txFillClrLst>
-    <dgm:txEffectClrLst/>
-  </dgm:styleLbl>
-  <dgm:styleLbl name="solidAlignAcc1">
-    <dgm:fillClrLst meth="repeat">
-      <a:schemeClr val="lt1"/>
-    </dgm:fillClrLst>
-    <dgm:linClrLst>
-      <a:schemeClr val="accent2"/>
-      <a:schemeClr val="accent3"/>
-    </dgm:linClrLst>
-    <dgm:effectClrLst/>
-    <dgm:txLinClrLst/>
-    <dgm:txFillClrLst meth="repeat">
-      <a:schemeClr val="dk1"/>
-    </dgm:txFillClrLst>
-    <dgm:txEffectClrLst/>
-  </dgm:styleLbl>
-  <dgm:styleLbl name="solidBgAcc1">
-    <dgm:fillClrLst meth="repeat">
-      <a:schemeClr val="lt1"/>
-    </dgm:fillClrLst>
-    <dgm:linClrLst>
-      <a:schemeClr val="accent2"/>
-      <a:schemeClr val="accent3"/>
-    </dgm:linClrLst>
-    <dgm:effectClrLst/>
-    <dgm:txLinClrLst/>
-    <dgm:txFillClrLst meth="repeat">
-      <a:schemeClr val="dk1"/>
-    </dgm:txFillClrLst>
-    <dgm:txEffectClrLst/>
-  </dgm:styleLbl>
-  <dgm:styleLbl name="fgAccFollowNode1">
-    <dgm:fillClrLst>
-      <a:schemeClr val="accent2">
-        <a:tint val="40000"/>
-        <a:alpha val="90000"/>
-      </a:schemeClr>
-      <a:schemeClr val="accent3">
-        <a:tint val="40000"/>
-        <a:alpha val="90000"/>
-      </a:schemeClr>
-    </dgm:fillClrLst>
-    <dgm:linClrLst>
-      <a:schemeClr val="accent2">
-        <a:tint val="40000"/>
-        <a:alpha val="90000"/>
-      </a:schemeClr>
-      <a:schemeClr val="accent3">
-        <a:tint val="40000"/>
-        <a:alpha val="90000"/>
-      </a:schemeClr>
-    </dgm:linClrLst>
-    <dgm:effectClrLst/>
-    <dgm:txLinClrLst/>
-    <dgm:txFillClrLst meth="repeat">
-      <a:schemeClr val="dk1"/>
-    </dgm:txFillClrLst>
-    <dgm:txEffectClrLst/>
-  </dgm:styleLbl>
-  <dgm:styleLbl name="alignAccFollowNode1">
-    <dgm:fillClrLst>
-      <a:schemeClr val="accent2">
-        <a:tint val="40000"/>
-        <a:alpha val="90000"/>
-      </a:schemeClr>
-      <a:schemeClr val="accent3">
-        <a:tint val="40000"/>
-        <a:alpha val="90000"/>
-      </a:schemeClr>
-    </dgm:fillClrLst>
-    <dgm:linClrLst>
-      <a:schemeClr val="accent2">
-        <a:tint val="40000"/>
-        <a:alpha val="90000"/>
-      </a:schemeClr>
-      <a:schemeClr val="accent3">
-        <a:tint val="40000"/>
-        <a:alpha val="90000"/>
-      </a:schemeClr>
-    </dgm:linClrLst>
-    <dgm:effectClrLst/>
-    <dgm:txLinClrLst/>
-    <dgm:txFillClrLst meth="repeat">
-      <a:schemeClr val="dk1"/>
-    </dgm:txFillClrLst>
-    <dgm:txEffectClrLst/>
-  </dgm:styleLbl>
-  <dgm:styleLbl name="bgAccFollowNode1">
-    <dgm:fillClrLst>
-      <a:schemeClr val="accent2">
-        <a:tint val="40000"/>
-        <a:alpha val="90000"/>
-      </a:schemeClr>
-      <a:schemeClr val="accent3">
-        <a:tint val="40000"/>
-        <a:alpha val="90000"/>
-      </a:schemeClr>
-    </dgm:fillClrLst>
-    <dgm:linClrLst>
-      <a:schemeClr val="accent2">
-        <a:tint val="40000"/>
-        <a:alpha val="90000"/>
-      </a:schemeClr>
-      <a:schemeClr val="accent3">
-        <a:tint val="40000"/>
-        <a:alpha val="90000"/>
-      </a:schemeClr>
-    </dgm:linClrLst>
-    <dgm:effectClrLst/>
-    <dgm:txLinClrLst/>
-    <dgm:txFillClrLst meth="repeat">
-      <a:schemeClr val="dk1"/>
-    </dgm:txFillClrLst>
-    <dgm:txEffectClrLst/>
-  </dgm:styleLbl>
-  <dgm:styleLbl name="fgAcc0">
-    <dgm:fillClrLst meth="repeat">
-      <a:schemeClr val="lt1">
-        <a:alpha val="90000"/>
-      </a:schemeClr>
-    </dgm:fillClrLst>
-    <dgm:linClrLst>
-      <a:schemeClr val="accent1"/>
-    </dgm:linClrLst>
-    <dgm:effectClrLst/>
-    <dgm:txLinClrLst/>
-    <dgm:txFillClrLst meth="repeat">
-      <a:schemeClr val="dk1"/>
-    </dgm:txFillClrLst>
-    <dgm:txEffectClrLst/>
-  </dgm:styleLbl>
-  <dgm:styleLbl name="fgAcc2">
-    <dgm:fillClrLst meth="repeat">
-      <a:schemeClr val="lt1">
-        <a:alpha val="90000"/>
-      </a:schemeClr>
-    </dgm:fillClrLst>
-    <dgm:linClrLst>
-      <a:schemeClr val="accent3"/>
-    </dgm:linClrLst>
-    <dgm:effectClrLst/>
-    <dgm:txLinClrLst/>
-    <dgm:txFillClrLst meth="repeat">
-      <a:schemeClr val="dk1"/>
-    </dgm:txFillClrLst>
-    <dgm:txEffectClrLst/>
-  </dgm:styleLbl>
-  <dgm:styleLbl name="fgAcc3">
-    <dgm:fillClrLst meth="repeat">
-      <a:schemeClr val="lt1">
-        <a:alpha val="90000"/>
-      </a:schemeClr>
-    </dgm:fillClrLst>
-    <dgm:linClrLst>
-      <a:schemeClr val="accent4"/>
-    </dgm:linClrLst>
-    <dgm:effectClrLst/>
-    <dgm:txLinClrLst/>
-    <dgm:txFillClrLst meth="repeat">
-      <a:schemeClr val="dk1"/>
-    </dgm:txFillClrLst>
-    <dgm:txEffectClrLst/>
-  </dgm:styleLbl>
-  <dgm:styleLbl name="fgAcc4">
-    <dgm:fillClrLst meth="repeat">
-      <a:schemeClr val="lt1">
-        <a:alpha val="90000"/>
-      </a:schemeClr>
-    </dgm:fillClrLst>
-    <dgm:linClrLst>
-      <a:schemeClr val="accent5"/>
-    </dgm:linClrLst>
-    <dgm:effectClrLst/>
-    <dgm:txLinClrLst/>
-    <dgm:txFillClrLst meth="repeat">
-      <a:schemeClr val="dk1"/>
-    </dgm:txFillClrLst>
-    <dgm:txEffectClrLst/>
-  </dgm:styleLbl>
-  <dgm:styleLbl name="bgShp">
-    <dgm:fillClrLst meth="repeat">
-      <a:schemeClr val="accent2">
-        <a:tint val="40000"/>
-      </a:schemeClr>
-    </dgm:fillClrLst>
-    <dgm:linClrLst meth="repeat">
-      <a:schemeClr val="dk1"/>
-    </dgm:linClrLst>
-    <dgm:effectClrLst/>
-    <dgm:txLinClrLst/>
-    <dgm:txFillClrLst meth="repeat">
-      <a:schemeClr val="dk1"/>
-    </dgm:txFillClrLst>
-    <dgm:txEffectClrLst/>
-  </dgm:styleLbl>
-  <dgm:styleLbl name="dkBgShp">
-    <dgm:fillClrLst meth="repeat">
-      <a:schemeClr val="accent2">
-        <a:shade val="90000"/>
-      </a:schemeClr>
-    </dgm:fillClrLst>
-    <dgm:linClrLst meth="repeat">
-      <a:schemeClr val="dk1"/>
-    </dgm:linClrLst>
-    <dgm:effectClrLst/>
-    <dgm:txLinClrLst/>
-    <dgm:txFillClrLst meth="repeat">
-      <a:schemeClr val="lt1"/>
-    </dgm:txFillClrLst>
-    <dgm:txEffectClrLst/>
-  </dgm:styleLbl>
-  <dgm:styleLbl name="trBgShp">
-    <dgm:fillClrLst meth="repeat">
-      <a:schemeClr val="accent2">
-        <a:tint val="50000"/>
-        <a:alpha val="40000"/>
-      </a:schemeClr>
-    </dgm:fillClrLst>
-    <dgm:linClrLst meth="repeat">
-      <a:schemeClr val="accent2"/>
-    </dgm:linClrLst>
-    <dgm:effectClrLst/>
-    <dgm:txLinClrLst/>
-    <dgm:txFillClrLst meth="repeat">
-      <a:schemeClr val="lt1"/>
-    </dgm:txFillClrLst>
-    <dgm:txEffectClrLst/>
-  </dgm:styleLbl>
-  <dgm:styleLbl name="fgShp">
-    <dgm:fillClrLst meth="repeat">
-      <a:schemeClr val="accent2">
-        <a:tint val="40000"/>
-      </a:schemeClr>
-    </dgm:fillClrLst>
-    <dgm:linClrLst meth="repeat">
-      <a:schemeClr val="lt1"/>
-    </dgm:linClrLst>
-    <dgm:effectClrLst/>
-    <dgm:txLinClrLst/>
-    <dgm:txFillClrLst meth="repeat">
-      <a:schemeClr val="dk1"/>
-    </dgm:txFillClrLst>
-    <dgm:txEffectClrLst/>
-  </dgm:styleLbl>
-  <dgm:styleLbl name="revTx">
-    <dgm:fillClrLst meth="repeat">
-      <a:schemeClr val="lt1">
-        <a:alpha val="0"/>
-      </a:schemeClr>
-    </dgm:fillClrLst>
-    <dgm:linClrLst meth="repeat">
-      <a:schemeClr val="dk1">
-        <a:alpha val="0"/>
-      </a:schemeClr>
-    </dgm:linClrLst>
-    <dgm:effectClrLst/>
-    <dgm:txLinClrLst/>
-    <dgm:txFillClrLst meth="repeat">
-      <a:schemeClr val="tx1"/>
-    </dgm:txFillClrLst>
-    <dgm:txEffectClrLst/>
-  </dgm:styleLbl>
-</dgm:colorsDef>
-</file>
-
-<file path=ppt/diagrams/data1.xml><?xml version="1.0" encoding="utf-8"?>
-<dgm:dataModel xmlns:dgm="http://schemas.openxmlformats.org/drawingml/2006/diagram" xmlns:a="http://schemas.openxmlformats.org/drawingml/2006/main">
-  <dgm:ptLst>
-    <dgm:pt modelId="{E3AD1B7C-B5AE-46BA-88FD-765846FC9C55}" type="doc">
-      <dgm:prSet loTypeId="urn:microsoft.com/office/officeart/2018/2/layout/IconVerticalSolidList" loCatId="icon" qsTypeId="urn:microsoft.com/office/officeart/2005/8/quickstyle/simple4" qsCatId="simple" csTypeId="urn:microsoft.com/office/officeart/2005/8/colors/colorful2" csCatId="colorful" phldr="1"/>
-      <dgm:spPr/>
-      <dgm:t>
-        <a:bodyPr/>
-        <a:lstStyle/>
-        <a:p>
-          <a:endParaRPr lang="en-US"/>
-        </a:p>
-      </dgm:t>
-    </dgm:pt>
-    <dgm:pt modelId="{6474651C-CBD1-4E02-BBB2-719CA38D0F4F}">
-      <dgm:prSet/>
-      <dgm:spPr/>
-      <dgm:t>
-        <a:bodyPr/>
-        <a:lstStyle/>
-        <a:p>
-          <a:pPr>
-            <a:lnSpc>
-              <a:spcPct val="100000"/>
-            </a:lnSpc>
-          </a:pPr>
-          <a:r>
-            <a:rPr lang="en-US" baseline="0" dirty="0"/>
-            <a:t>A </a:t>
-          </a:r>
-          <a:r>
-            <a:rPr lang="en-US" baseline="0" dirty="0" err="1"/>
-            <a:t>yaml</a:t>
-          </a:r>
-          <a:r>
-            <a:rPr lang="en-US" baseline="0" dirty="0"/>
-            <a:t> (yet another markup language) file declares how your pod is configured</a:t>
-          </a:r>
-          <a:endParaRPr lang="en-US" dirty="0"/>
-        </a:p>
-      </dgm:t>
-    </dgm:pt>
-    <dgm:pt modelId="{6F7ECD8E-A857-46B9-808C-7D3F062795FE}" type="parTrans" cxnId="{724D184D-F938-4682-BE0F-DE2C1C6A3FDF}">
-      <dgm:prSet/>
-      <dgm:spPr/>
-      <dgm:t>
-        <a:bodyPr/>
-        <a:lstStyle/>
-        <a:p>
-          <a:endParaRPr lang="en-US"/>
-        </a:p>
-      </dgm:t>
-    </dgm:pt>
-    <dgm:pt modelId="{CF541B5B-D9BB-442E-A719-974A7A5BCAC8}" type="sibTrans" cxnId="{724D184D-F938-4682-BE0F-DE2C1C6A3FDF}">
-      <dgm:prSet/>
-      <dgm:spPr/>
-      <dgm:t>
-        <a:bodyPr/>
-        <a:lstStyle/>
-        <a:p>
-          <a:endParaRPr lang="en-US"/>
-        </a:p>
-      </dgm:t>
-    </dgm:pt>
-    <dgm:pt modelId="{CE53537F-E5DD-4E31-9F41-CEC893CA7106}">
-      <dgm:prSet/>
-      <dgm:spPr/>
-      <dgm:t>
-        <a:bodyPr/>
-        <a:lstStyle/>
-        <a:p>
-          <a:pPr>
-            <a:lnSpc>
-              <a:spcPct val="100000"/>
-            </a:lnSpc>
-          </a:pPr>
-          <a:r>
-            <a:rPr lang="en-US" baseline="0"/>
-            <a:t>Four required elements:</a:t>
-          </a:r>
-          <a:endParaRPr lang="en-US"/>
-        </a:p>
-      </dgm:t>
-    </dgm:pt>
-    <dgm:pt modelId="{BF53144E-DA52-4A79-A484-44DBD4204339}" type="parTrans" cxnId="{F298F1EA-E644-4EA0-8378-3DE3B77F06B4}">
-      <dgm:prSet/>
-      <dgm:spPr/>
-      <dgm:t>
-        <a:bodyPr/>
-        <a:lstStyle/>
-        <a:p>
-          <a:endParaRPr lang="en-US"/>
-        </a:p>
-      </dgm:t>
-    </dgm:pt>
-    <dgm:pt modelId="{D083A6BA-55E1-4779-A5E9-8223C8DC7BBF}" type="sibTrans" cxnId="{F298F1EA-E644-4EA0-8378-3DE3B77F06B4}">
-      <dgm:prSet/>
-      <dgm:spPr/>
-      <dgm:t>
-        <a:bodyPr/>
-        <a:lstStyle/>
-        <a:p>
-          <a:endParaRPr lang="en-US"/>
-        </a:p>
-      </dgm:t>
-    </dgm:pt>
-    <dgm:pt modelId="{2DB4781B-62E6-4AD7-A732-91127996217C}">
-      <dgm:prSet/>
-      <dgm:spPr/>
-      <dgm:t>
-        <a:bodyPr/>
-        <a:lstStyle/>
-        <a:p>
-          <a:pPr>
-            <a:lnSpc>
-              <a:spcPct val="100000"/>
-            </a:lnSpc>
-          </a:pPr>
-          <a:r>
-            <a:rPr lang="en-US" baseline="0"/>
-            <a:t>Apiversion – v1</a:t>
-          </a:r>
-          <a:endParaRPr lang="en-US"/>
-        </a:p>
-      </dgm:t>
-    </dgm:pt>
-    <dgm:pt modelId="{BC52B27E-BFDD-4500-80F1-E15580B0CF63}" type="parTrans" cxnId="{B2CD9F0E-1AB0-42B8-AFE7-75964141A1B6}">
-      <dgm:prSet/>
-      <dgm:spPr/>
-      <dgm:t>
-        <a:bodyPr/>
-        <a:lstStyle/>
-        <a:p>
-          <a:endParaRPr lang="en-US"/>
-        </a:p>
-      </dgm:t>
-    </dgm:pt>
-    <dgm:pt modelId="{617FF579-9426-4C41-8C76-D30B19F8CEC1}" type="sibTrans" cxnId="{B2CD9F0E-1AB0-42B8-AFE7-75964141A1B6}">
-      <dgm:prSet/>
-      <dgm:spPr/>
-      <dgm:t>
-        <a:bodyPr/>
-        <a:lstStyle/>
-        <a:p>
-          <a:endParaRPr lang="en-US"/>
-        </a:p>
-      </dgm:t>
-    </dgm:pt>
-    <dgm:pt modelId="{41D0A2E1-D867-4334-BE26-490B46B1CACC}">
-      <dgm:prSet/>
-      <dgm:spPr/>
-      <dgm:t>
-        <a:bodyPr/>
-        <a:lstStyle/>
-        <a:p>
-          <a:pPr>
-            <a:lnSpc>
-              <a:spcPct val="100000"/>
-            </a:lnSpc>
-          </a:pPr>
-          <a:r>
-            <a:rPr lang="en-US" baseline="0"/>
-            <a:t>Kind – pod, service etc</a:t>
-          </a:r>
-          <a:endParaRPr lang="en-US"/>
-        </a:p>
-      </dgm:t>
-    </dgm:pt>
-    <dgm:pt modelId="{AB0E0ABB-AF45-43EB-B420-5A38DD62999F}" type="parTrans" cxnId="{DD9BBD3A-1089-4CF0-8787-16851B3FFF96}">
-      <dgm:prSet/>
-      <dgm:spPr/>
-      <dgm:t>
-        <a:bodyPr/>
-        <a:lstStyle/>
-        <a:p>
-          <a:endParaRPr lang="en-US"/>
-        </a:p>
-      </dgm:t>
-    </dgm:pt>
-    <dgm:pt modelId="{229397C0-B4D2-4BC8-8D24-24964BA8911B}" type="sibTrans" cxnId="{DD9BBD3A-1089-4CF0-8787-16851B3FFF96}">
-      <dgm:prSet/>
-      <dgm:spPr/>
-      <dgm:t>
-        <a:bodyPr/>
-        <a:lstStyle/>
-        <a:p>
-          <a:endParaRPr lang="en-US"/>
-        </a:p>
-      </dgm:t>
-    </dgm:pt>
-    <dgm:pt modelId="{C5254A97-3DA4-45F6-9FC2-A86027B22DD1}">
-      <dgm:prSet/>
-      <dgm:spPr/>
-      <dgm:t>
-        <a:bodyPr/>
-        <a:lstStyle/>
-        <a:p>
-          <a:pPr>
-            <a:lnSpc>
-              <a:spcPct val="100000"/>
-            </a:lnSpc>
-          </a:pPr>
-          <a:r>
-            <a:rPr lang="en-US" baseline="0"/>
-            <a:t>Metadata – pod name, pod labels</a:t>
-          </a:r>
-          <a:endParaRPr lang="en-US"/>
-        </a:p>
-      </dgm:t>
-    </dgm:pt>
-    <dgm:pt modelId="{AF9F89E2-FFE0-40A9-9467-6FB3EE1ED914}" type="parTrans" cxnId="{CAC50205-A841-4E94-AA51-55FE0B4E7599}">
-      <dgm:prSet/>
-      <dgm:spPr/>
-      <dgm:t>
-        <a:bodyPr/>
-        <a:lstStyle/>
-        <a:p>
-          <a:endParaRPr lang="en-US"/>
-        </a:p>
-      </dgm:t>
-    </dgm:pt>
-    <dgm:pt modelId="{DF571E12-2C79-45E3-9A68-1B0A0D30E288}" type="sibTrans" cxnId="{CAC50205-A841-4E94-AA51-55FE0B4E7599}">
-      <dgm:prSet/>
-      <dgm:spPr/>
-      <dgm:t>
-        <a:bodyPr/>
-        <a:lstStyle/>
-        <a:p>
-          <a:endParaRPr lang="en-US"/>
-        </a:p>
-      </dgm:t>
-    </dgm:pt>
-    <dgm:pt modelId="{875614C7-11C4-46AA-96BF-31BD5CAD5024}">
-      <dgm:prSet/>
-      <dgm:spPr/>
-      <dgm:t>
-        <a:bodyPr/>
-        <a:lstStyle/>
-        <a:p>
-          <a:pPr>
-            <a:lnSpc>
-              <a:spcPct val="100000"/>
-            </a:lnSpc>
-          </a:pPr>
-          <a:r>
-            <a:rPr lang="en-US" baseline="0"/>
-            <a:t>Spec – define the docker image, Resource limits (cpu, ram), Security context, storage config </a:t>
-          </a:r>
-          <a:endParaRPr lang="en-US"/>
-        </a:p>
-      </dgm:t>
-    </dgm:pt>
-    <dgm:pt modelId="{CB49CFDE-4F66-4DA6-B617-87EE2CE64E12}" type="parTrans" cxnId="{6091AB56-6EF2-430D-8465-5E578ACE9171}">
-      <dgm:prSet/>
-      <dgm:spPr/>
-      <dgm:t>
-        <a:bodyPr/>
-        <a:lstStyle/>
-        <a:p>
-          <a:endParaRPr lang="en-US"/>
-        </a:p>
-      </dgm:t>
-    </dgm:pt>
-    <dgm:pt modelId="{22081CEE-556A-4430-A3D1-455949A59005}" type="sibTrans" cxnId="{6091AB56-6EF2-430D-8465-5E578ACE9171}">
-      <dgm:prSet/>
-      <dgm:spPr/>
-      <dgm:t>
-        <a:bodyPr/>
-        <a:lstStyle/>
-        <a:p>
-          <a:endParaRPr lang="en-US"/>
-        </a:p>
-      </dgm:t>
-    </dgm:pt>
-    <dgm:pt modelId="{C9454D6D-A418-4C4C-81ED-DD6F77F21796}" type="pres">
-      <dgm:prSet presAssocID="{E3AD1B7C-B5AE-46BA-88FD-765846FC9C55}" presName="root" presStyleCnt="0">
-        <dgm:presLayoutVars>
-          <dgm:dir/>
-          <dgm:resizeHandles val="exact"/>
-        </dgm:presLayoutVars>
-      </dgm:prSet>
-      <dgm:spPr/>
-    </dgm:pt>
-    <dgm:pt modelId="{630B90CD-2AA0-4DC2-8CC6-5F403238AC03}" type="pres">
-      <dgm:prSet presAssocID="{6474651C-CBD1-4E02-BBB2-719CA38D0F4F}" presName="compNode" presStyleCnt="0"/>
-      <dgm:spPr/>
-    </dgm:pt>
-    <dgm:pt modelId="{CBDC015C-38FC-47D7-BB6F-2D63E999E00A}" type="pres">
-      <dgm:prSet presAssocID="{6474651C-CBD1-4E02-BBB2-719CA38D0F4F}" presName="bgRect" presStyleLbl="bgShp" presStyleIdx="0" presStyleCnt="2"/>
-      <dgm:spPr/>
-    </dgm:pt>
-    <dgm:pt modelId="{2C132FDC-1D50-47C6-A6A3-2529FCD3F56A}" type="pres">
-      <dgm:prSet presAssocID="{6474651C-CBD1-4E02-BBB2-719CA38D0F4F}" presName="iconRect" presStyleLbl="node1" presStyleIdx="0" presStyleCnt="2"/>
-      <dgm:spPr>
-        <a:blipFill>
-          <a:blip xmlns:r="http://schemas.openxmlformats.org/officeDocument/2006/relationships" r:embed="rId1">
-            <a:extLst>
-              <a:ext uri="{28A0092B-C50C-407E-A947-70E740481C1C}">
-                <a14:useLocalDpi xmlns:a14="http://schemas.microsoft.com/office/drawing/2010/main" val="0"/>
-              </a:ext>
-              <a:ext uri="{96DAC541-7B7A-43D3-8B79-37D633B846F1}">
-                <asvg:svgBlip xmlns:asvg="http://schemas.microsoft.com/office/drawing/2016/SVG/main" r:embed="rId2"/>
-              </a:ext>
-            </a:extLst>
-          </a:blip>
-          <a:stretch>
-            <a:fillRect/>
-          </a:stretch>
-        </a:blipFill>
-      </dgm:spPr>
-      <dgm:extLst>
-        <a:ext uri="{E40237B7-FDA0-4F09-8148-C483321AD2D9}">
-          <dgm14:cNvPr xmlns:dgm14="http://schemas.microsoft.com/office/drawing/2010/diagram" id="0" name="" descr="Database"/>
-        </a:ext>
-      </dgm:extLst>
-    </dgm:pt>
-    <dgm:pt modelId="{31783742-48E3-403C-AAEE-92F941256C52}" type="pres">
-      <dgm:prSet presAssocID="{6474651C-CBD1-4E02-BBB2-719CA38D0F4F}" presName="spaceRect" presStyleCnt="0"/>
-      <dgm:spPr/>
-    </dgm:pt>
-    <dgm:pt modelId="{F25D1AC5-9579-47A7-AA55-A67DE69985CA}" type="pres">
-      <dgm:prSet presAssocID="{6474651C-CBD1-4E02-BBB2-719CA38D0F4F}" presName="parTx" presStyleLbl="revTx" presStyleIdx="0" presStyleCnt="3">
-        <dgm:presLayoutVars>
-          <dgm:chMax val="0"/>
-          <dgm:chPref val="0"/>
-        </dgm:presLayoutVars>
-      </dgm:prSet>
-      <dgm:spPr/>
-    </dgm:pt>
-    <dgm:pt modelId="{3688E8A6-688D-411E-A1F6-02B6560CA6E3}" type="pres">
-      <dgm:prSet presAssocID="{CF541B5B-D9BB-442E-A719-974A7A5BCAC8}" presName="sibTrans" presStyleCnt="0"/>
-      <dgm:spPr/>
-    </dgm:pt>
-    <dgm:pt modelId="{4303DA11-0967-4025-B161-B7135B35DDE8}" type="pres">
-      <dgm:prSet presAssocID="{CE53537F-E5DD-4E31-9F41-CEC893CA7106}" presName="compNode" presStyleCnt="0"/>
-      <dgm:spPr/>
-    </dgm:pt>
-    <dgm:pt modelId="{D2A82F78-E04C-4E01-8A1F-7B684B9D56F6}" type="pres">
-      <dgm:prSet presAssocID="{CE53537F-E5DD-4E31-9F41-CEC893CA7106}" presName="bgRect" presStyleLbl="bgShp" presStyleIdx="1" presStyleCnt="2"/>
-      <dgm:spPr/>
-    </dgm:pt>
-    <dgm:pt modelId="{EAA04485-BDC7-4D1F-B37B-4ACB6E806DEA}" type="pres">
-      <dgm:prSet presAssocID="{CE53537F-E5DD-4E31-9F41-CEC893CA7106}" presName="iconRect" presStyleLbl="node1" presStyleIdx="1" presStyleCnt="2"/>
-      <dgm:spPr>
-        <a:blipFill>
-          <a:blip xmlns:r="http://schemas.openxmlformats.org/officeDocument/2006/relationships" r:embed="rId3">
-            <a:extLst>
-              <a:ext uri="{28A0092B-C50C-407E-A947-70E740481C1C}">
-                <a14:useLocalDpi xmlns:a14="http://schemas.microsoft.com/office/drawing/2010/main" val="0"/>
-              </a:ext>
-              <a:ext uri="{96DAC541-7B7A-43D3-8B79-37D633B846F1}">
-                <asvg:svgBlip xmlns:asvg="http://schemas.microsoft.com/office/drawing/2016/SVG/main" r:embed="rId4"/>
-              </a:ext>
-            </a:extLst>
-          </a:blip>
-          <a:stretch>
-            <a:fillRect/>
-          </a:stretch>
-        </a:blipFill>
-      </dgm:spPr>
-      <dgm:extLst>
-        <a:ext uri="{E40237B7-FDA0-4F09-8148-C483321AD2D9}">
-          <dgm14:cNvPr xmlns:dgm14="http://schemas.microsoft.com/office/drawing/2010/diagram" id="0" name="" descr="Document"/>
-        </a:ext>
-      </dgm:extLst>
-    </dgm:pt>
-    <dgm:pt modelId="{9516FBE1-B99C-43DD-9342-F74CF6A612DF}" type="pres">
-      <dgm:prSet presAssocID="{CE53537F-E5DD-4E31-9F41-CEC893CA7106}" presName="spaceRect" presStyleCnt="0"/>
-      <dgm:spPr/>
-    </dgm:pt>
-    <dgm:pt modelId="{25FE9AEC-C99A-42F2-915D-AED19C123754}" type="pres">
-      <dgm:prSet presAssocID="{CE53537F-E5DD-4E31-9F41-CEC893CA7106}" presName="parTx" presStyleLbl="revTx" presStyleIdx="1" presStyleCnt="3">
-        <dgm:presLayoutVars>
-          <dgm:chMax val="0"/>
-          <dgm:chPref val="0"/>
-        </dgm:presLayoutVars>
-      </dgm:prSet>
-      <dgm:spPr/>
-    </dgm:pt>
-    <dgm:pt modelId="{CAF7FBF6-4ABE-40D8-AAC0-D123ADA40741}" type="pres">
-      <dgm:prSet presAssocID="{CE53537F-E5DD-4E31-9F41-CEC893CA7106}" presName="desTx" presStyleLbl="revTx" presStyleIdx="2" presStyleCnt="3">
-        <dgm:presLayoutVars/>
-      </dgm:prSet>
-      <dgm:spPr/>
-    </dgm:pt>
-  </dgm:ptLst>
-  <dgm:cxnLst>
-    <dgm:cxn modelId="{CAC50205-A841-4E94-AA51-55FE0B4E7599}" srcId="{CE53537F-E5DD-4E31-9F41-CEC893CA7106}" destId="{C5254A97-3DA4-45F6-9FC2-A86027B22DD1}" srcOrd="2" destOrd="0" parTransId="{AF9F89E2-FFE0-40A9-9467-6FB3EE1ED914}" sibTransId="{DF571E12-2C79-45E3-9A68-1B0A0D30E288}"/>
-    <dgm:cxn modelId="{B2CD9F0E-1AB0-42B8-AFE7-75964141A1B6}" srcId="{CE53537F-E5DD-4E31-9F41-CEC893CA7106}" destId="{2DB4781B-62E6-4AD7-A732-91127996217C}" srcOrd="0" destOrd="0" parTransId="{BC52B27E-BFDD-4500-80F1-E15580B0CF63}" sibTransId="{617FF579-9426-4C41-8C76-D30B19F8CEC1}"/>
-    <dgm:cxn modelId="{380A301D-4716-C949-A7CF-5BCD6CDEF9E2}" type="presOf" srcId="{2DB4781B-62E6-4AD7-A732-91127996217C}" destId="{CAF7FBF6-4ABE-40D8-AAC0-D123ADA40741}" srcOrd="0" destOrd="0" presId="urn:microsoft.com/office/officeart/2018/2/layout/IconVerticalSolidList"/>
-    <dgm:cxn modelId="{DD9BBD3A-1089-4CF0-8787-16851B3FFF96}" srcId="{CE53537F-E5DD-4E31-9F41-CEC893CA7106}" destId="{41D0A2E1-D867-4334-BE26-490B46B1CACC}" srcOrd="1" destOrd="0" parTransId="{AB0E0ABB-AF45-43EB-B420-5A38DD62999F}" sibTransId="{229397C0-B4D2-4BC8-8D24-24964BA8911B}"/>
-    <dgm:cxn modelId="{B8198D44-417B-AF44-B7A6-A8677D51EB75}" type="presOf" srcId="{6474651C-CBD1-4E02-BBB2-719CA38D0F4F}" destId="{F25D1AC5-9579-47A7-AA55-A67DE69985CA}" srcOrd="0" destOrd="0" presId="urn:microsoft.com/office/officeart/2018/2/layout/IconVerticalSolidList"/>
-    <dgm:cxn modelId="{724D184D-F938-4682-BE0F-DE2C1C6A3FDF}" srcId="{E3AD1B7C-B5AE-46BA-88FD-765846FC9C55}" destId="{6474651C-CBD1-4E02-BBB2-719CA38D0F4F}" srcOrd="0" destOrd="0" parTransId="{6F7ECD8E-A857-46B9-808C-7D3F062795FE}" sibTransId="{CF541B5B-D9BB-442E-A719-974A7A5BCAC8}"/>
-    <dgm:cxn modelId="{B520B255-33C3-D949-8EC8-A373B0388732}" type="presOf" srcId="{CE53537F-E5DD-4E31-9F41-CEC893CA7106}" destId="{25FE9AEC-C99A-42F2-915D-AED19C123754}" srcOrd="0" destOrd="0" presId="urn:microsoft.com/office/officeart/2018/2/layout/IconVerticalSolidList"/>
-    <dgm:cxn modelId="{6091AB56-6EF2-430D-8465-5E578ACE9171}" srcId="{CE53537F-E5DD-4E31-9F41-CEC893CA7106}" destId="{875614C7-11C4-46AA-96BF-31BD5CAD5024}" srcOrd="3" destOrd="0" parTransId="{CB49CFDE-4F66-4DA6-B617-87EE2CE64E12}" sibTransId="{22081CEE-556A-4430-A3D1-455949A59005}"/>
-    <dgm:cxn modelId="{8CAB5164-4240-7E46-A6B6-18CB5C3E42F8}" type="presOf" srcId="{41D0A2E1-D867-4334-BE26-490B46B1CACC}" destId="{CAF7FBF6-4ABE-40D8-AAC0-D123ADA40741}" srcOrd="0" destOrd="1" presId="urn:microsoft.com/office/officeart/2018/2/layout/IconVerticalSolidList"/>
-    <dgm:cxn modelId="{F9F181AC-F252-2E4C-B212-0C5F91658FD9}" type="presOf" srcId="{C5254A97-3DA4-45F6-9FC2-A86027B22DD1}" destId="{CAF7FBF6-4ABE-40D8-AAC0-D123ADA40741}" srcOrd="0" destOrd="2" presId="urn:microsoft.com/office/officeart/2018/2/layout/IconVerticalSolidList"/>
-    <dgm:cxn modelId="{A95105E0-37AF-7341-8CE2-4C88C7B64411}" type="presOf" srcId="{875614C7-11C4-46AA-96BF-31BD5CAD5024}" destId="{CAF7FBF6-4ABE-40D8-AAC0-D123ADA40741}" srcOrd="0" destOrd="3" presId="urn:microsoft.com/office/officeart/2018/2/layout/IconVerticalSolidList"/>
-    <dgm:cxn modelId="{F298F1EA-E644-4EA0-8378-3DE3B77F06B4}" srcId="{E3AD1B7C-B5AE-46BA-88FD-765846FC9C55}" destId="{CE53537F-E5DD-4E31-9F41-CEC893CA7106}" srcOrd="1" destOrd="0" parTransId="{BF53144E-DA52-4A79-A484-44DBD4204339}" sibTransId="{D083A6BA-55E1-4779-A5E9-8223C8DC7BBF}"/>
-    <dgm:cxn modelId="{A86461FC-83D0-6E46-9D6C-9A3CD4F946A3}" type="presOf" srcId="{E3AD1B7C-B5AE-46BA-88FD-765846FC9C55}" destId="{C9454D6D-A418-4C4C-81ED-DD6F77F21796}" srcOrd="0" destOrd="0" presId="urn:microsoft.com/office/officeart/2018/2/layout/IconVerticalSolidList"/>
-    <dgm:cxn modelId="{AE3AEE04-C79A-D846-A904-49A0961A371C}" type="presParOf" srcId="{C9454D6D-A418-4C4C-81ED-DD6F77F21796}" destId="{630B90CD-2AA0-4DC2-8CC6-5F403238AC03}" srcOrd="0" destOrd="0" presId="urn:microsoft.com/office/officeart/2018/2/layout/IconVerticalSolidList"/>
-    <dgm:cxn modelId="{A779E189-C274-1E47-AC8E-466694F641A9}" type="presParOf" srcId="{630B90CD-2AA0-4DC2-8CC6-5F403238AC03}" destId="{CBDC015C-38FC-47D7-BB6F-2D63E999E00A}" srcOrd="0" destOrd="0" presId="urn:microsoft.com/office/officeart/2018/2/layout/IconVerticalSolidList"/>
-    <dgm:cxn modelId="{40F6691C-C5A5-6441-B64F-164394BE5E9F}" type="presParOf" srcId="{630B90CD-2AA0-4DC2-8CC6-5F403238AC03}" destId="{2C132FDC-1D50-47C6-A6A3-2529FCD3F56A}" srcOrd="1" destOrd="0" presId="urn:microsoft.com/office/officeart/2018/2/layout/IconVerticalSolidList"/>
-    <dgm:cxn modelId="{1FB3A6D0-29FE-0349-9AB6-C46627DDACE3}" type="presParOf" srcId="{630B90CD-2AA0-4DC2-8CC6-5F403238AC03}" destId="{31783742-48E3-403C-AAEE-92F941256C52}" srcOrd="2" destOrd="0" presId="urn:microsoft.com/office/officeart/2018/2/layout/IconVerticalSolidList"/>
-    <dgm:cxn modelId="{24D4A7DA-CA8D-394F-B5ED-7398C2A3368A}" type="presParOf" srcId="{630B90CD-2AA0-4DC2-8CC6-5F403238AC03}" destId="{F25D1AC5-9579-47A7-AA55-A67DE69985CA}" srcOrd="3" destOrd="0" presId="urn:microsoft.com/office/officeart/2018/2/layout/IconVerticalSolidList"/>
-    <dgm:cxn modelId="{CDA06715-5710-E64F-95AA-3AC567FCAFBC}" type="presParOf" srcId="{C9454D6D-A418-4C4C-81ED-DD6F77F21796}" destId="{3688E8A6-688D-411E-A1F6-02B6560CA6E3}" srcOrd="1" destOrd="0" presId="urn:microsoft.com/office/officeart/2018/2/layout/IconVerticalSolidList"/>
-    <dgm:cxn modelId="{DAF1E819-DAD3-2E48-B193-54287DC14DA9}" type="presParOf" srcId="{C9454D6D-A418-4C4C-81ED-DD6F77F21796}" destId="{4303DA11-0967-4025-B161-B7135B35DDE8}" srcOrd="2" destOrd="0" presId="urn:microsoft.com/office/officeart/2018/2/layout/IconVerticalSolidList"/>
-    <dgm:cxn modelId="{A400B43D-7992-E749-A911-9FA6FADF27E1}" type="presParOf" srcId="{4303DA11-0967-4025-B161-B7135B35DDE8}" destId="{D2A82F78-E04C-4E01-8A1F-7B684B9D56F6}" srcOrd="0" destOrd="0" presId="urn:microsoft.com/office/officeart/2018/2/layout/IconVerticalSolidList"/>
-    <dgm:cxn modelId="{2D90B163-9332-D148-94E9-FAEE66CF9E1B}" type="presParOf" srcId="{4303DA11-0967-4025-B161-B7135B35DDE8}" destId="{EAA04485-BDC7-4D1F-B37B-4ACB6E806DEA}" srcOrd="1" destOrd="0" presId="urn:microsoft.com/office/officeart/2018/2/layout/IconVerticalSolidList"/>
-    <dgm:cxn modelId="{D9370B3C-BB80-6F4E-B410-888D83CE7975}" type="presParOf" srcId="{4303DA11-0967-4025-B161-B7135B35DDE8}" destId="{9516FBE1-B99C-43DD-9342-F74CF6A612DF}" srcOrd="2" destOrd="0" presId="urn:microsoft.com/office/officeart/2018/2/layout/IconVerticalSolidList"/>
-    <dgm:cxn modelId="{2D342344-D6A0-E44E-A6FA-EF824D6B552D}" type="presParOf" srcId="{4303DA11-0967-4025-B161-B7135B35DDE8}" destId="{25FE9AEC-C99A-42F2-915D-AED19C123754}" srcOrd="3" destOrd="0" presId="urn:microsoft.com/office/officeart/2018/2/layout/IconVerticalSolidList"/>
-    <dgm:cxn modelId="{6017D51C-61D5-EE47-A02A-9D8214D3A780}" type="presParOf" srcId="{4303DA11-0967-4025-B161-B7135B35DDE8}" destId="{CAF7FBF6-4ABE-40D8-AAC0-D123ADA40741}" srcOrd="4" destOrd="0" presId="urn:microsoft.com/office/officeart/2018/2/layout/IconVerticalSolidList"/>
-  </dgm:cxnLst>
-  <dgm:bg/>
-  <dgm:whole/>
-  <dgm:extLst>
-    <a:ext uri="http://schemas.microsoft.com/office/drawing/2008/diagram">
-      <dsp:dataModelExt xmlns:dsp="http://schemas.microsoft.com/office/drawing/2008/diagram" relId="rId8" minVer="http://schemas.openxmlformats.org/drawingml/2006/diagram"/>
-    </a:ext>
-  </dgm:extLst>
-</dgm:dataModel>
-</file>
-
-<file path=ppt/diagrams/drawing1.xml><?xml version="1.0" encoding="utf-8"?>
-<dsp:drawing xmlns:dgm="http://schemas.openxmlformats.org/drawingml/2006/diagram" xmlns:dsp="http://schemas.microsoft.com/office/drawing/2008/diagram" xmlns:a="http://schemas.openxmlformats.org/drawingml/2006/main">
-  <dsp:spTree>
-    <dsp:nvGrpSpPr>
-      <dsp:cNvPr id="0" name=""/>
-      <dsp:cNvGrpSpPr/>
-    </dsp:nvGrpSpPr>
-    <dsp:grpSpPr/>
-    <dsp:sp modelId="{CBDC015C-38FC-47D7-BB6F-2D63E999E00A}">
-      <dsp:nvSpPr>
-        <dsp:cNvPr id="0" name=""/>
-        <dsp:cNvSpPr/>
-      </dsp:nvSpPr>
-      <dsp:spPr>
+<file path=ppt/notesMasters/notesMaster1.xml><?xml version="1.0" encoding="utf-8"?>
+<p:notesMaster xmlns:a="http://schemas.openxmlformats.org/drawingml/2006/main" xmlns:r="http://schemas.openxmlformats.org/officeDocument/2006/relationships" xmlns:p="http://schemas.openxmlformats.org/presentationml/2006/main">
+  <p:cSld>
+    <p:bg>
+      <p:bgRef idx="1001">
+        <a:schemeClr val="bg1"/>
+      </p:bgRef>
+    </p:bg>
+    <p:spTree>
+      <p:nvGrpSpPr>
+        <p:cNvPr id="1" name=""/>
+        <p:cNvGrpSpPr/>
+        <p:nvPr/>
+      </p:nvGrpSpPr>
+      <p:grpSpPr>
         <a:xfrm>
-          <a:off x="0" y="751660"/>
-          <a:ext cx="6683374" cy="1379379"/>
+          <a:off x="0" y="0"/>
+          <a:ext cx="0" cy="0"/>
+          <a:chOff x="0" y="0"/>
+          <a:chExt cx="0" cy="0"/>
         </a:xfrm>
-        <a:prstGeom prst="roundRect">
-          <a:avLst>
-            <a:gd name="adj" fmla="val 10000"/>
-          </a:avLst>
-        </a:prstGeom>
+      </p:grpSpPr>
+      <p:sp>
+        <p:nvSpPr>
+          <p:cNvPr id="2" name="Header Placeholder 1"/>
+          <p:cNvSpPr>
+            <a:spLocks noGrp="1"/>
+          </p:cNvSpPr>
+          <p:nvPr>
+            <p:ph type="hdr" sz="quarter"/>
+          </p:nvPr>
+        </p:nvSpPr>
+        <p:spPr>
+          <a:xfrm>
+            <a:off x="0" y="0"/>
+            <a:ext cx="2971800" cy="458788"/>
+          </a:xfrm>
+          <a:prstGeom prst="rect">
+            <a:avLst/>
+          </a:prstGeom>
+        </p:spPr>
+        <p:txBody>
+          <a:bodyPr vert="horz" lIns="91440" tIns="45720" rIns="91440" bIns="45720" rtlCol="0"/>
+          <a:lstStyle>
+            <a:lvl1pPr algn="l">
+              <a:defRPr sz="1200"/>
+            </a:lvl1pPr>
+          </a:lstStyle>
+          <a:p>
+            <a:endParaRPr lang="en-US"/>
+          </a:p>
+        </p:txBody>
+      </p:sp>
+      <p:sp>
+        <p:nvSpPr>
+          <p:cNvPr id="3" name="Date Placeholder 2"/>
+          <p:cNvSpPr>
+            <a:spLocks noGrp="1"/>
+          </p:cNvSpPr>
+          <p:nvPr>
+            <p:ph type="dt" idx="1"/>
+          </p:nvPr>
+        </p:nvSpPr>
+        <p:spPr>
+          <a:xfrm>
+            <a:off x="3884613" y="0"/>
+            <a:ext cx="2971800" cy="458788"/>
+          </a:xfrm>
+          <a:prstGeom prst="rect">
+            <a:avLst/>
+          </a:prstGeom>
+        </p:spPr>
+        <p:txBody>
+          <a:bodyPr vert="horz" lIns="91440" tIns="45720" rIns="91440" bIns="45720" rtlCol="0"/>
+          <a:lstStyle>
+            <a:lvl1pPr algn="r">
+              <a:defRPr sz="1200"/>
+            </a:lvl1pPr>
+          </a:lstStyle>
+          <a:p>
+            <a:fld id="{4FF3681E-1319-3041-91CC-DE051DBD8B17}" type="datetimeFigureOut">
+              <a:rPr lang="en-US" smtClean="0"/>
+              <a:t>2/24/21</a:t>
+            </a:fld>
+            <a:endParaRPr lang="en-US"/>
+          </a:p>
+        </p:txBody>
+      </p:sp>
+      <p:sp>
+        <p:nvSpPr>
+          <p:cNvPr id="4" name="Slide Image Placeholder 3"/>
+          <p:cNvSpPr>
+            <a:spLocks noGrp="1" noRot="1" noChangeAspect="1"/>
+          </p:cNvSpPr>
+          <p:nvPr>
+            <p:ph type="sldImg" idx="2"/>
+          </p:nvPr>
+        </p:nvSpPr>
+        <p:spPr>
+          <a:xfrm>
+            <a:off x="685800" y="1143000"/>
+            <a:ext cx="5486400" cy="3086100"/>
+          </a:xfrm>
+          <a:prstGeom prst="rect">
+            <a:avLst/>
+          </a:prstGeom>
+          <a:noFill/>
+          <a:ln w="12700">
+            <a:solidFill>
+              <a:prstClr val="black"/>
+            </a:solidFill>
+          </a:ln>
+        </p:spPr>
+        <p:txBody>
+          <a:bodyPr vert="horz" lIns="91440" tIns="45720" rIns="91440" bIns="45720" rtlCol="0" anchor="ctr"/>
+          <a:lstStyle/>
+          <a:p>
+            <a:endParaRPr lang="en-US"/>
+          </a:p>
+        </p:txBody>
+      </p:sp>
+      <p:sp>
+        <p:nvSpPr>
+          <p:cNvPr id="5" name="Notes Placeholder 4"/>
+          <p:cNvSpPr>
+            <a:spLocks noGrp="1"/>
+          </p:cNvSpPr>
+          <p:nvPr>
+            <p:ph type="body" sz="quarter" idx="3"/>
+          </p:nvPr>
+        </p:nvSpPr>
+        <p:spPr>
+          <a:xfrm>
+            <a:off x="685800" y="4400550"/>
+            <a:ext cx="5486400" cy="3600450"/>
+          </a:xfrm>
+          <a:prstGeom prst="rect">
+            <a:avLst/>
+          </a:prstGeom>
+        </p:spPr>
+        <p:txBody>
+          <a:bodyPr vert="horz" lIns="91440" tIns="45720" rIns="91440" bIns="45720" rtlCol="0"/>
+          <a:lstStyle/>
+          <a:p>
+            <a:pPr lvl="0"/>
+            <a:r>
+              <a:rPr lang="en-US"/>
+              <a:t>Click to edit Master text styles</a:t>
+            </a:r>
+          </a:p>
+          <a:p>
+            <a:pPr lvl="1"/>
+            <a:r>
+              <a:rPr lang="en-US"/>
+              <a:t>Second level</a:t>
+            </a:r>
+          </a:p>
+          <a:p>
+            <a:pPr lvl="2"/>
+            <a:r>
+              <a:rPr lang="en-US"/>
+              <a:t>Third level</a:t>
+            </a:r>
+          </a:p>
+          <a:p>
+            <a:pPr lvl="3"/>
+            <a:r>
+              <a:rPr lang="en-US"/>
+              <a:t>Fourth level</a:t>
+            </a:r>
+          </a:p>
+          <a:p>
+            <a:pPr lvl="4"/>
+            <a:r>
+              <a:rPr lang="en-US"/>
+              <a:t>Fifth level</a:t>
+            </a:r>
+          </a:p>
+        </p:txBody>
+      </p:sp>
+      <p:sp>
+        <p:nvSpPr>
+          <p:cNvPr id="6" name="Footer Placeholder 5"/>
+          <p:cNvSpPr>
+            <a:spLocks noGrp="1"/>
+          </p:cNvSpPr>
+          <p:nvPr>
+            <p:ph type="ftr" sz="quarter" idx="4"/>
+          </p:nvPr>
+        </p:nvSpPr>
+        <p:spPr>
+          <a:xfrm>
+            <a:off x="0" y="8685213"/>
+            <a:ext cx="2971800" cy="458787"/>
+          </a:xfrm>
+          <a:prstGeom prst="rect">
+            <a:avLst/>
+          </a:prstGeom>
+        </p:spPr>
+        <p:txBody>
+          <a:bodyPr vert="horz" lIns="91440" tIns="45720" rIns="91440" bIns="45720" rtlCol="0" anchor="b"/>
+          <a:lstStyle>
+            <a:lvl1pPr algn="l">
+              <a:defRPr sz="1200"/>
+            </a:lvl1pPr>
+          </a:lstStyle>
+          <a:p>
+            <a:endParaRPr lang="en-US"/>
+          </a:p>
+        </p:txBody>
+      </p:sp>
+      <p:sp>
+        <p:nvSpPr>
+          <p:cNvPr id="7" name="Slide Number Placeholder 6"/>
+          <p:cNvSpPr>
+            <a:spLocks noGrp="1"/>
+          </p:cNvSpPr>
+          <p:nvPr>
+            <p:ph type="sldNum" sz="quarter" idx="5"/>
+          </p:nvPr>
+        </p:nvSpPr>
+        <p:spPr>
+          <a:xfrm>
+            <a:off x="3884613" y="8685213"/>
+            <a:ext cx="2971800" cy="458787"/>
+          </a:xfrm>
+          <a:prstGeom prst="rect">
+            <a:avLst/>
+          </a:prstGeom>
+        </p:spPr>
+        <p:txBody>
+          <a:bodyPr vert="horz" lIns="91440" tIns="45720" rIns="91440" bIns="45720" rtlCol="0" anchor="b"/>
+          <a:lstStyle>
+            <a:lvl1pPr algn="r">
+              <a:defRPr sz="1200"/>
+            </a:lvl1pPr>
+          </a:lstStyle>
+          <a:p>
+            <a:fld id="{9AACECE8-563E-CB4C-8D51-568FB86CD780}" type="slidenum">
+              <a:rPr lang="en-US" smtClean="0"/>
+              <a:t>‹#›</a:t>
+            </a:fld>
+            <a:endParaRPr lang="en-US"/>
+          </a:p>
+        </p:txBody>
+      </p:sp>
+    </p:spTree>
+    <p:extLst>
+      <p:ext uri="{BB962C8B-B14F-4D97-AF65-F5344CB8AC3E}">
+        <p14:creationId xmlns:p14="http://schemas.microsoft.com/office/powerpoint/2010/main" val="2680630785"/>
+      </p:ext>
+    </p:extLst>
+  </p:cSld>
+  <p:clrMap bg1="lt1" tx1="dk1" bg2="lt2" tx2="dk2" accent1="accent1" accent2="accent2" accent3="accent3" accent4="accent4" accent5="accent5" accent6="accent6" hlink="hlink" folHlink="folHlink"/>
+  <p:notesStyle>
+    <a:lvl1pPr marL="0" algn="l" defTabSz="914400" rtl="0" eaLnBrk="1" latinLnBrk="0" hangingPunct="1">
+      <a:defRPr sz="1200" kern="1200">
         <a:solidFill>
-          <a:schemeClr val="accent2">
-            <a:tint val="40000"/>
-            <a:hueOff val="0"/>
-            <a:satOff val="0"/>
-            <a:lumOff val="0"/>
-            <a:alphaOff val="0"/>
-          </a:schemeClr>
+          <a:schemeClr val="tx1"/>
         </a:solidFill>
-        <a:ln>
-          <a:noFill/>
-        </a:ln>
-        <a:effectLst>
-          <a:outerShdw blurRad="50800" dist="25400" dir="5400000" rotWithShape="0">
-            <a:srgbClr val="000000">
-              <a:alpha val="28000"/>
-            </a:srgbClr>
-          </a:outerShdw>
-        </a:effectLst>
-      </dsp:spPr>
-      <dsp:style>
-        <a:lnRef idx="0">
-          <a:scrgbClr r="0" g="0" b="0"/>
-        </a:lnRef>
-        <a:fillRef idx="1">
-          <a:scrgbClr r="0" g="0" b="0"/>
-        </a:fillRef>
-        <a:effectRef idx="2">
-          <a:scrgbClr r="0" g="0" b="0"/>
-        </a:effectRef>
-        <a:fontRef idx="minor"/>
-      </dsp:style>
-    </dsp:sp>
-    <dsp:sp modelId="{2C132FDC-1D50-47C6-A6A3-2529FCD3F56A}">
-      <dsp:nvSpPr>
-        <dsp:cNvPr id="0" name=""/>
-        <dsp:cNvSpPr/>
-      </dsp:nvSpPr>
-      <dsp:spPr>
-        <a:xfrm>
-          <a:off x="417262" y="1062020"/>
-          <a:ext cx="758658" cy="758658"/>
-        </a:xfrm>
-        <a:prstGeom prst="rect">
-          <a:avLst/>
-        </a:prstGeom>
-        <a:blipFill>
-          <a:blip xmlns:r="http://schemas.openxmlformats.org/officeDocument/2006/relationships" r:embed="rId1">
-            <a:extLst>
-              <a:ext uri="{28A0092B-C50C-407E-A947-70E740481C1C}">
-                <a14:useLocalDpi xmlns:a14="http://schemas.microsoft.com/office/drawing/2010/main" val="0"/>
-              </a:ext>
-              <a:ext uri="{96DAC541-7B7A-43D3-8B79-37D633B846F1}">
-                <asvg:svgBlip xmlns:asvg="http://schemas.microsoft.com/office/drawing/2016/SVG/main" r:embed="rId2"/>
-              </a:ext>
-            </a:extLst>
-          </a:blip>
-          <a:stretch>
-            <a:fillRect/>
-          </a:stretch>
-        </a:blipFill>
-        <a:ln>
-          <a:noFill/>
-        </a:ln>
-        <a:effectLst>
-          <a:outerShdw blurRad="50800" dist="25400" dir="5400000" rotWithShape="0">
-            <a:srgbClr val="000000">
-              <a:alpha val="28000"/>
-            </a:srgbClr>
-          </a:outerShdw>
-        </a:effectLst>
-      </dsp:spPr>
-      <dsp:style>
-        <a:lnRef idx="0">
-          <a:scrgbClr r="0" g="0" b="0"/>
-        </a:lnRef>
-        <a:fillRef idx="3">
-          <a:scrgbClr r="0" g="0" b="0"/>
-        </a:fillRef>
-        <a:effectRef idx="2">
-          <a:scrgbClr r="0" g="0" b="0"/>
-        </a:effectRef>
-        <a:fontRef idx="minor">
-          <a:schemeClr val="lt1"/>
-        </a:fontRef>
-      </dsp:style>
-    </dsp:sp>
-    <dsp:sp modelId="{F25D1AC5-9579-47A7-AA55-A67DE69985CA}">
-      <dsp:nvSpPr>
-        <dsp:cNvPr id="0" name=""/>
-        <dsp:cNvSpPr/>
-      </dsp:nvSpPr>
-      <dsp:spPr>
-        <a:xfrm>
-          <a:off x="1593183" y="751660"/>
-          <a:ext cx="5088634" cy="1379379"/>
-        </a:xfrm>
-        <a:prstGeom prst="rect">
-          <a:avLst/>
-        </a:prstGeom>
-        <a:noFill/>
-        <a:ln>
-          <a:noFill/>
-        </a:ln>
-        <a:effectLst/>
-      </dsp:spPr>
-      <dsp:style>
-        <a:lnRef idx="0">
-          <a:scrgbClr r="0" g="0" b="0"/>
-        </a:lnRef>
-        <a:fillRef idx="0">
-          <a:scrgbClr r="0" g="0" b="0"/>
-        </a:fillRef>
-        <a:effectRef idx="0">
-          <a:scrgbClr r="0" g="0" b="0"/>
-        </a:effectRef>
-        <a:fontRef idx="minor"/>
-      </dsp:style>
-      <dsp:txBody>
-        <a:bodyPr spcFirstLastPara="0" vert="horz" wrap="square" lIns="145984" tIns="145984" rIns="145984" bIns="145984" numCol="1" spcCol="1270" anchor="ctr" anchorCtr="0">
-          <a:noAutofit/>
-        </a:bodyPr>
-        <a:lstStyle/>
-        <a:p>
-          <a:pPr marL="0" lvl="0" indent="0" algn="l" defTabSz="1111250">
-            <a:lnSpc>
-              <a:spcPct val="100000"/>
-            </a:lnSpc>
-            <a:spcBef>
-              <a:spcPct val="0"/>
-            </a:spcBef>
-            <a:spcAft>
-              <a:spcPct val="35000"/>
-            </a:spcAft>
-            <a:buNone/>
-          </a:pPr>
-          <a:r>
-            <a:rPr lang="en-US" sz="2500" kern="1200" baseline="0" dirty="0"/>
-            <a:t>A </a:t>
-          </a:r>
-          <a:r>
-            <a:rPr lang="en-US" sz="2500" kern="1200" baseline="0" dirty="0" err="1"/>
-            <a:t>yaml</a:t>
-          </a:r>
-          <a:r>
-            <a:rPr lang="en-US" sz="2500" kern="1200" baseline="0" dirty="0"/>
-            <a:t> (yet another markup language) file declares how your pod is configured</a:t>
-          </a:r>
-          <a:endParaRPr lang="en-US" sz="2500" kern="1200" dirty="0"/>
-        </a:p>
-      </dsp:txBody>
-      <dsp:txXfrm>
-        <a:off x="1593183" y="751660"/>
-        <a:ext cx="5088634" cy="1379379"/>
-      </dsp:txXfrm>
-    </dsp:sp>
-    <dsp:sp modelId="{D2A82F78-E04C-4E01-8A1F-7B684B9D56F6}">
-      <dsp:nvSpPr>
-        <dsp:cNvPr id="0" name=""/>
-        <dsp:cNvSpPr/>
-      </dsp:nvSpPr>
-      <dsp:spPr>
-        <a:xfrm>
-          <a:off x="0" y="2475884"/>
-          <a:ext cx="6683374" cy="1379379"/>
-        </a:xfrm>
-        <a:prstGeom prst="roundRect">
-          <a:avLst>
-            <a:gd name="adj" fmla="val 10000"/>
-          </a:avLst>
-        </a:prstGeom>
+        <a:latin typeface="+mn-lt"/>
+        <a:ea typeface="+mn-ea"/>
+        <a:cs typeface="+mn-cs"/>
+      </a:defRPr>
+    </a:lvl1pPr>
+    <a:lvl2pPr marL="457200" algn="l" defTabSz="914400" rtl="0" eaLnBrk="1" latinLnBrk="0" hangingPunct="1">
+      <a:defRPr sz="1200" kern="1200">
         <a:solidFill>
-          <a:schemeClr val="accent2">
-            <a:tint val="40000"/>
-            <a:hueOff val="0"/>
-            <a:satOff val="0"/>
-            <a:lumOff val="0"/>
-            <a:alphaOff val="0"/>
-          </a:schemeClr>
+          <a:schemeClr val="tx1"/>
         </a:solidFill>
-        <a:ln>
-          <a:noFill/>
-        </a:ln>
-        <a:effectLst>
-          <a:outerShdw blurRad="50800" dist="25400" dir="5400000" rotWithShape="0">
-            <a:srgbClr val="000000">
-              <a:alpha val="28000"/>
-            </a:srgbClr>
-          </a:outerShdw>
-        </a:effectLst>
-      </dsp:spPr>
-      <dsp:style>
-        <a:lnRef idx="0">
-          <a:scrgbClr r="0" g="0" b="0"/>
-        </a:lnRef>
-        <a:fillRef idx="1">
-          <a:scrgbClr r="0" g="0" b="0"/>
-        </a:fillRef>
-        <a:effectRef idx="2">
-          <a:scrgbClr r="0" g="0" b="0"/>
-        </a:effectRef>
-        <a:fontRef idx="minor"/>
-      </dsp:style>
-    </dsp:sp>
-    <dsp:sp modelId="{EAA04485-BDC7-4D1F-B37B-4ACB6E806DEA}">
-      <dsp:nvSpPr>
-        <dsp:cNvPr id="0" name=""/>
-        <dsp:cNvSpPr/>
-      </dsp:nvSpPr>
-      <dsp:spPr>
-        <a:xfrm>
-          <a:off x="417262" y="2786245"/>
-          <a:ext cx="758658" cy="758658"/>
-        </a:xfrm>
-        <a:prstGeom prst="rect">
-          <a:avLst/>
-        </a:prstGeom>
-        <a:blipFill>
-          <a:blip xmlns:r="http://schemas.openxmlformats.org/officeDocument/2006/relationships" r:embed="rId3">
-            <a:extLst>
-              <a:ext uri="{28A0092B-C50C-407E-A947-70E740481C1C}">
-                <a14:useLocalDpi xmlns:a14="http://schemas.microsoft.com/office/drawing/2010/main" val="0"/>
-              </a:ext>
-              <a:ext uri="{96DAC541-7B7A-43D3-8B79-37D633B846F1}">
-                <asvg:svgBlip xmlns:asvg="http://schemas.microsoft.com/office/drawing/2016/SVG/main" r:embed="rId4"/>
-              </a:ext>
-            </a:extLst>
-          </a:blip>
-          <a:stretch>
-            <a:fillRect/>
-          </a:stretch>
-        </a:blipFill>
-        <a:ln>
-          <a:noFill/>
-        </a:ln>
-        <a:effectLst>
-          <a:outerShdw blurRad="50800" dist="25400" dir="5400000" rotWithShape="0">
-            <a:srgbClr val="000000">
-              <a:alpha val="28000"/>
-            </a:srgbClr>
-          </a:outerShdw>
-        </a:effectLst>
-      </dsp:spPr>
-      <dsp:style>
-        <a:lnRef idx="0">
-          <a:scrgbClr r="0" g="0" b="0"/>
-        </a:lnRef>
-        <a:fillRef idx="3">
-          <a:scrgbClr r="0" g="0" b="0"/>
-        </a:fillRef>
-        <a:effectRef idx="2">
-          <a:scrgbClr r="0" g="0" b="0"/>
-        </a:effectRef>
-        <a:fontRef idx="minor">
-          <a:schemeClr val="lt1"/>
-        </a:fontRef>
-      </dsp:style>
-    </dsp:sp>
-    <dsp:sp modelId="{25FE9AEC-C99A-42F2-915D-AED19C123754}">
-      <dsp:nvSpPr>
-        <dsp:cNvPr id="0" name=""/>
-        <dsp:cNvSpPr/>
-      </dsp:nvSpPr>
-      <dsp:spPr>
-        <a:xfrm>
-          <a:off x="1593183" y="2475884"/>
-          <a:ext cx="3007518" cy="1379379"/>
-        </a:xfrm>
-        <a:prstGeom prst="rect">
-          <a:avLst/>
-        </a:prstGeom>
-        <a:noFill/>
-        <a:ln>
-          <a:noFill/>
-        </a:ln>
-        <a:effectLst/>
-      </dsp:spPr>
-      <dsp:style>
-        <a:lnRef idx="0">
-          <a:scrgbClr r="0" g="0" b="0"/>
-        </a:lnRef>
-        <a:fillRef idx="0">
-          <a:scrgbClr r="0" g="0" b="0"/>
-        </a:fillRef>
-        <a:effectRef idx="0">
-          <a:scrgbClr r="0" g="0" b="0"/>
-        </a:effectRef>
-        <a:fontRef idx="minor"/>
-      </dsp:style>
-      <dsp:txBody>
-        <a:bodyPr spcFirstLastPara="0" vert="horz" wrap="square" lIns="145984" tIns="145984" rIns="145984" bIns="145984" numCol="1" spcCol="1270" anchor="ctr" anchorCtr="0">
-          <a:noAutofit/>
-        </a:bodyPr>
-        <a:lstStyle/>
-        <a:p>
-          <a:pPr marL="0" lvl="0" indent="0" algn="l" defTabSz="1111250">
-            <a:lnSpc>
-              <a:spcPct val="100000"/>
-            </a:lnSpc>
-            <a:spcBef>
-              <a:spcPct val="0"/>
-            </a:spcBef>
-            <a:spcAft>
-              <a:spcPct val="35000"/>
-            </a:spcAft>
-            <a:buNone/>
-          </a:pPr>
-          <a:r>
-            <a:rPr lang="en-US" sz="2500" kern="1200" baseline="0"/>
-            <a:t>Four required elements:</a:t>
-          </a:r>
-          <a:endParaRPr lang="en-US" sz="2500" kern="1200"/>
-        </a:p>
-      </dsp:txBody>
-      <dsp:txXfrm>
-        <a:off x="1593183" y="2475884"/>
-        <a:ext cx="3007518" cy="1379379"/>
-      </dsp:txXfrm>
-    </dsp:sp>
-    <dsp:sp modelId="{CAF7FBF6-4ABE-40D8-AAC0-D123ADA40741}">
-      <dsp:nvSpPr>
-        <dsp:cNvPr id="0" name=""/>
-        <dsp:cNvSpPr/>
-      </dsp:nvSpPr>
-      <dsp:spPr>
-        <a:xfrm>
-          <a:off x="4600702" y="2475884"/>
-          <a:ext cx="2081115" cy="1379379"/>
-        </a:xfrm>
-        <a:prstGeom prst="rect">
-          <a:avLst/>
-        </a:prstGeom>
-        <a:noFill/>
-        <a:ln>
-          <a:noFill/>
-        </a:ln>
-        <a:effectLst/>
-      </dsp:spPr>
-      <dsp:style>
-        <a:lnRef idx="0">
-          <a:scrgbClr r="0" g="0" b="0"/>
-        </a:lnRef>
-        <a:fillRef idx="0">
-          <a:scrgbClr r="0" g="0" b="0"/>
-        </a:fillRef>
-        <a:effectRef idx="0">
-          <a:scrgbClr r="0" g="0" b="0"/>
-        </a:effectRef>
-        <a:fontRef idx="minor"/>
-      </dsp:style>
-      <dsp:txBody>
-        <a:bodyPr spcFirstLastPara="0" vert="horz" wrap="square" lIns="145984" tIns="145984" rIns="145984" bIns="145984" numCol="1" spcCol="1270" anchor="ctr" anchorCtr="0">
-          <a:noAutofit/>
-        </a:bodyPr>
-        <a:lstStyle/>
-        <a:p>
-          <a:pPr marL="0" lvl="0" indent="0" algn="l" defTabSz="488950">
-            <a:lnSpc>
-              <a:spcPct val="100000"/>
-            </a:lnSpc>
-            <a:spcBef>
-              <a:spcPct val="0"/>
-            </a:spcBef>
-            <a:spcAft>
-              <a:spcPct val="35000"/>
-            </a:spcAft>
-            <a:buNone/>
-          </a:pPr>
-          <a:r>
-            <a:rPr lang="en-US" sz="1100" kern="1200" baseline="0"/>
-            <a:t>Apiversion – v1</a:t>
-          </a:r>
-          <a:endParaRPr lang="en-US" sz="1100" kern="1200"/>
-        </a:p>
-        <a:p>
-          <a:pPr marL="0" lvl="0" indent="0" algn="l" defTabSz="488950">
-            <a:lnSpc>
-              <a:spcPct val="100000"/>
-            </a:lnSpc>
-            <a:spcBef>
-              <a:spcPct val="0"/>
-            </a:spcBef>
-            <a:spcAft>
-              <a:spcPct val="35000"/>
-            </a:spcAft>
-            <a:buNone/>
-          </a:pPr>
-          <a:r>
-            <a:rPr lang="en-US" sz="1100" kern="1200" baseline="0"/>
-            <a:t>Kind – pod, service etc</a:t>
-          </a:r>
-          <a:endParaRPr lang="en-US" sz="1100" kern="1200"/>
-        </a:p>
-        <a:p>
-          <a:pPr marL="0" lvl="0" indent="0" algn="l" defTabSz="488950">
-            <a:lnSpc>
-              <a:spcPct val="100000"/>
-            </a:lnSpc>
-            <a:spcBef>
-              <a:spcPct val="0"/>
-            </a:spcBef>
-            <a:spcAft>
-              <a:spcPct val="35000"/>
-            </a:spcAft>
-            <a:buNone/>
-          </a:pPr>
-          <a:r>
-            <a:rPr lang="en-US" sz="1100" kern="1200" baseline="0"/>
-            <a:t>Metadata – pod name, pod labels</a:t>
-          </a:r>
-          <a:endParaRPr lang="en-US" sz="1100" kern="1200"/>
-        </a:p>
-        <a:p>
-          <a:pPr marL="0" lvl="0" indent="0" algn="l" defTabSz="488950">
-            <a:lnSpc>
-              <a:spcPct val="100000"/>
-            </a:lnSpc>
-            <a:spcBef>
-              <a:spcPct val="0"/>
-            </a:spcBef>
-            <a:spcAft>
-              <a:spcPct val="35000"/>
-            </a:spcAft>
-            <a:buNone/>
-          </a:pPr>
-          <a:r>
-            <a:rPr lang="en-US" sz="1100" kern="1200" baseline="0"/>
-            <a:t>Spec – define the docker image, Resource limits (cpu, ram), Security context, storage config </a:t>
-          </a:r>
-          <a:endParaRPr lang="en-US" sz="1100" kern="1200"/>
-        </a:p>
-      </dsp:txBody>
-      <dsp:txXfrm>
-        <a:off x="4600702" y="2475884"/>
-        <a:ext cx="2081115" cy="1379379"/>
-      </dsp:txXfrm>
-    </dsp:sp>
-  </dsp:spTree>
-</dsp:drawing>
-</file>
-
-<file path=ppt/diagrams/layout1.xml><?xml version="1.0" encoding="utf-8"?>
-<dgm:layoutDef xmlns:dgm="http://schemas.openxmlformats.org/drawingml/2006/diagram" xmlns:a="http://schemas.openxmlformats.org/drawingml/2006/main" uniqueId="urn:microsoft.com/office/officeart/2018/2/layout/IconVerticalSolidList">
-  <dgm:title val="Icon Vertical Solid List"/>
-  <dgm:desc val="Use to show a series of visuals from top to bottom with Level 1 or Level 1 and Level 2 text grouped in a shape. Works best with icons or small pictures with lengthier descriptions."/>
-  <dgm:catLst>
-    <dgm:cat type="icon" pri="500"/>
-  </dgm:catLst>
-  <dgm:sampData useDef="1">
-    <dgm:dataModel>
-      <dgm:ptLst/>
-      <dgm:bg/>
-      <dgm:whole/>
-    </dgm:dataModel>
-  </dgm:sampData>
-  <dgm:styleData useDef="1">
-    <dgm:dataModel>
-      <dgm:ptLst/>
-      <dgm:bg/>
-      <dgm:whole/>
-    </dgm:dataModel>
-  </dgm:styleData>
-  <dgm:clrData useDef="1">
-    <dgm:dataModel>
-      <dgm:ptLst/>
-      <dgm:bg/>
-      <dgm:whole/>
-    </dgm:dataModel>
-  </dgm:clrData>
-  <dgm:layoutNode name="root">
-    <dgm:varLst>
-      <dgm:dir/>
-      <dgm:resizeHandles val="exact"/>
-    </dgm:varLst>
-    <dgm:choose name="Name0">
-      <dgm:if name="Name1" axis="self" func="var" arg="dir" op="equ" val="norm">
-        <dgm:alg type="lin">
-          <dgm:param type="linDir" val="fromT"/>
-          <dgm:param type="nodeHorzAlign" val="l"/>
-        </dgm:alg>
-      </dgm:if>
-      <dgm:else name="Name2">
-        <dgm:alg type="lin">
-          <dgm:param type="linDir" val="fromT"/>
-          <dgm:param type="nodeHorzAlign" val="r"/>
-        </dgm:alg>
-      </dgm:else>
-    </dgm:choose>
-    <dgm:shape xmlns:r="http://schemas.openxmlformats.org/officeDocument/2006/relationships" r:blip="">
-      <dgm:adjLst/>
-    </dgm:shape>
-    <dgm:presOf/>
-    <dgm:choose name="Name3">
-      <dgm:if name="Name4" axis="ch" ptType="node" func="cnt" op="lte" val="3">
-        <dgm:constrLst>
-          <dgm:constr type="h" for="ch" forName="compNode" refType="h" fact="0.3"/>
-          <dgm:constr type="w" for="ch" forName="compNode" refType="w"/>
-          <dgm:constr type="h" for="ch" forName="sibTrans" refType="h" refFor="ch" refForName="compNode" fact="0.25"/>
-          <dgm:constr type="primFontSz" for="des" forName="parTx" val="25"/>
-          <dgm:constr type="primFontSz" for="des" forName="desTx" refType="primFontSz" refFor="des" refForName="parTx" op="lte" fact="0.75"/>
-          <dgm:constr type="h" for="des" forName="compNode" op="equ"/>
-          <dgm:constr type="h" for="des" forName="bgRect" op="equ"/>
-          <dgm:constr type="h" for="des" forName="iconRect" op="equ"/>
-          <dgm:constr type="w" for="des" forName="iconRect" op="equ"/>
-          <dgm:constr type="h" for="des" forName="spaceRect" op="equ"/>
-          <dgm:constr type="h" for="des" forName="parTx" op="equ"/>
-          <dgm:constr type="h" for="des" forName="desTx" op="equ"/>
-        </dgm:constrLst>
-      </dgm:if>
-      <dgm:if name="Name5" axis="ch" ptType="node" func="cnt" op="lte" val="4">
-        <dgm:constrLst>
-          <dgm:constr type="h" for="ch" forName="compNode" refType="h" fact="0.3"/>
-          <dgm:constr type="w" for="ch" forName="compNode" refType="w"/>
-          <dgm:constr type="h" for="ch" forName="sibTrans" refType="h" refFor="ch" refForName="compNode" fact="0.25"/>
-          <dgm:constr type="primFontSz" for="des" forName="parTx" val="22"/>
-          <dgm:constr type="primFontSz" for="des" forName="desTx" refType="primFontSz" refFor="des" refForName="parTx" op="lte" fact="0.75"/>
-          <dgm:constr type="h" for="des" forName="compNode" op="equ"/>
-          <dgm:constr type="h" for="des" forName="bgRect" op="equ"/>
-          <dgm:constr type="h" for="des" forName="iconRect" op="equ"/>
-          <dgm:constr type="w" for="des" forName="iconRect" op="equ"/>
-          <dgm:constr type="h" for="des" forName="spaceRect" op="equ"/>
-          <dgm:constr type="h" for="des" forName="parTx" op="equ"/>
-          <dgm:constr type="h" for="des" forName="desTx" op="equ"/>
-        </dgm:constrLst>
-      </dgm:if>
-      <dgm:if name="Name6" axis="ch" ptType="node" func="cnt" op="lte" val="6">
-        <dgm:constrLst>
-          <dgm:constr type="h" for="ch" forName="compNode" refType="h" fact="0.3"/>
-          <dgm:constr type="w" for="ch" forName="compNode" refType="w"/>
-          <dgm:constr type="h" for="ch" forName="sibTrans" refType="h" refFor="ch" refForName="compNode" fact="0.25"/>
-          <dgm:constr type="primFontSz" for="des" forName="parTx" val="19"/>
-          <dgm:constr type="primFontSz" for="des" forName="desTx" refType="primFontSz" refFor="des" refForName="parTx" op="lte" fact="0.75"/>
-          <dgm:constr type="h" for="des" forName="compNode" op="equ"/>
-          <dgm:constr type="h" for="des" forName="bgRect" op="equ"/>
-          <dgm:constr type="h" for="des" forName="iconRect" op="equ"/>
-          <dgm:constr type="w" for="des" forName="iconRect" op="equ"/>
-          <dgm:constr type="h" for="des" forName="spaceRect" op="equ"/>
-          <dgm:constr type="h" for="des" forName="parTx" op="equ"/>
-          <dgm:constr type="h" for="des" forName="desTx" op="equ"/>
-        </dgm:constrLst>
-      </dgm:if>
-      <dgm:else name="Name7">
-        <dgm:constrLst>
-          <dgm:constr type="h" for="ch" forName="compNode" refType="h" fact="0.3"/>
-          <dgm:constr type="w" for="ch" forName="compNode" refType="w"/>
-          <dgm:constr type="h" for="ch" forName="sibTrans" refType="h" refFor="ch" refForName="compNode" fact="0.25"/>
-          <dgm:constr type="primFontSz" for="des" forName="parTx" val="16"/>
-          <dgm:constr type="primFontSz" for="des" forName="desTx" refType="primFontSz" refFor="des" refForName="parTx" op="lte" fact="0.75"/>
-          <dgm:constr type="h" for="des" forName="compNode" op="equ"/>
-          <dgm:constr type="h" for="des" forName="bgRect" op="equ"/>
-          <dgm:constr type="h" for="des" forName="iconRect" op="equ"/>
-          <dgm:constr type="w" for="des" forName="iconRect" op="equ"/>
-          <dgm:constr type="h" for="des" forName="spaceRect" op="equ"/>
-          <dgm:constr type="h" for="des" forName="parTx" op="equ"/>
-          <dgm:constr type="h" for="des" forName="desTx" op="equ"/>
-        </dgm:constrLst>
-      </dgm:else>
-    </dgm:choose>
-    <dgm:ruleLst>
-      <dgm:rule type="h" for="ch" forName="compNode" val="0" fact="NaN" max="NaN"/>
-    </dgm:ruleLst>
-    <dgm:forEach name="Name8" axis="ch" ptType="node">
-      <dgm:layoutNode name="compNode">
-        <dgm:alg type="composite"/>
-        <dgm:shape xmlns:r="http://schemas.openxmlformats.org/officeDocument/2006/relationships" r:blip="">
-          <dgm:adjLst/>
-        </dgm:shape>
-        <dgm:presOf axis="self"/>
-        <dgm:choose name="Name9">
-          <dgm:if name="Name10" axis="ch" ptType="node" func="cnt" op="gte" val="1">
-            <dgm:constrLst>
-              <dgm:constr type="w" for="ch" forName="bgRect" refType="w"/>
-              <dgm:constr type="h" for="ch" forName="bgRect" refType="h"/>
-              <dgm:constr type="l" for="ch" forName="bgRect"/>
-              <dgm:constr type="t" for="ch" forName="bgRect"/>
-              <dgm:constr type="h" for="ch" forName="iconRect" refType="h" fact="0.55"/>
-              <dgm:constr type="w" for="ch" forName="iconRect" refType="h" refFor="ch" refForName="iconRect"/>
-              <dgm:constr type="l" for="ch" forName="iconRect" refType="h" refFor="ch" refForName="iconRect" fact="0.55"/>
-              <dgm:constr type="ctrY" for="ch" forName="iconRect" refType="ctrY" refFor="ch" refForName="bgRect"/>
-              <dgm:constr type="w" for="ch" forName="spaceRect" refType="l" refFor="ch" refForName="iconRect"/>
-              <dgm:constr type="h" for="ch" forName="spaceRect" refType="h"/>
-              <dgm:constr type="l" for="ch" forName="spaceRect" refType="r" refFor="ch" refForName="iconRect"/>
-              <dgm:constr type="t" for="ch" forName="spaceRect"/>
-              <dgm:constr type="w" for="ch" forName="parTx" refType="w" fact="0.45"/>
-              <dgm:constr type="h" for="ch" forName="parTx" refType="h"/>
-              <dgm:constr type="l" for="ch" forName="parTx" refType="r" refFor="ch" refForName="spaceRect"/>
-              <dgm:constr type="t" for="ch" forName="parTx"/>
-              <dgm:constr type="h" for="ch" forName="desTx" refType="h"/>
-              <dgm:constr type="l" for="ch" forName="desTx" refType="r" refFor="ch" refForName="parTx"/>
-              <dgm:constr type="t" for="ch" forName="desTx"/>
-            </dgm:constrLst>
-          </dgm:if>
-          <dgm:else name="Name11">
-            <dgm:constrLst>
-              <dgm:constr type="w" for="ch" forName="bgRect" refType="w"/>
-              <dgm:constr type="h" for="ch" forName="bgRect" refType="h"/>
-              <dgm:constr type="l" for="ch" forName="bgRect"/>
-              <dgm:constr type="t" for="ch" forName="bgRect"/>
-              <dgm:constr type="h" for="ch" forName="iconRect" refType="h" fact="0.55"/>
-              <dgm:constr type="w" for="ch" forName="iconRect" refType="h" refFor="ch" refForName="iconRect"/>
-              <dgm:constr type="l" for="ch" forName="iconRect" refType="h" refFor="ch" refForName="iconRect" fact="0.55"/>
-              <dgm:constr type="ctrY" for="ch" forName="iconRect" refType="ctrY" refFor="ch" refForName="bgRect"/>
-              <dgm:constr type="w" for="ch" forName="spaceRect" refType="l" refFor="ch" refForName="iconRect"/>
-              <dgm:constr type="h" for="ch" forName="spaceRect" refType="h"/>
-              <dgm:constr type="l" for="ch" forName="spaceRect" refType="r" refFor="ch" refForName="iconRect"/>
-              <dgm:constr type="t" for="ch" forName="spaceRect"/>
-              <dgm:constr type="h" for="ch" forName="parTx" refType="h"/>
-              <dgm:constr type="l" for="ch" forName="parTx" refType="r" refFor="ch" refForName="spaceRect"/>
-              <dgm:constr type="t" for="ch" forName="parTx"/>
-            </dgm:constrLst>
-          </dgm:else>
-        </dgm:choose>
-        <dgm:ruleLst>
-          <dgm:rule type="h" val="INF" fact="NaN" max="NaN"/>
-        </dgm:ruleLst>
-        <dgm:layoutNode name="bgRect" styleLbl="bgShp">
-          <dgm:alg type="sp"/>
-          <dgm:shape xmlns:r="http://schemas.openxmlformats.org/officeDocument/2006/relationships" type="roundRect" r:blip="">
-            <dgm:adjLst>
-              <dgm:adj idx="1" val="0.1"/>
-            </dgm:adjLst>
-          </dgm:shape>
-          <dgm:presOf/>
-          <dgm:constrLst/>
-          <dgm:ruleLst/>
-        </dgm:layoutNode>
-        <dgm:layoutNode name="iconRect" styleLbl="node1">
-          <dgm:alg type="sp"/>
-          <dgm:shape xmlns:r="http://schemas.openxmlformats.org/officeDocument/2006/relationships" type="rect" r:blip="" blipPhldr="1">
-            <dgm:adjLst/>
-          </dgm:shape>
-          <dgm:presOf/>
-          <dgm:constrLst/>
-          <dgm:ruleLst/>
-        </dgm:layoutNode>
-        <dgm:layoutNode name="spaceRect">
-          <dgm:alg type="sp"/>
-          <dgm:shape xmlns:r="http://schemas.openxmlformats.org/officeDocument/2006/relationships" r:blip="">
-            <dgm:adjLst/>
-          </dgm:shape>
-          <dgm:presOf/>
-          <dgm:constrLst/>
-          <dgm:ruleLst/>
-        </dgm:layoutNode>
-        <dgm:layoutNode name="parTx" styleLbl="revTx">
-          <dgm:varLst>
-            <dgm:chMax val="0"/>
-            <dgm:chPref val="0"/>
-          </dgm:varLst>
-          <dgm:alg type="tx">
-            <dgm:param type="txAnchorVert" val="mid"/>
-            <dgm:param type="parTxLTRAlign" val="l"/>
-            <dgm:param type="shpTxLTRAlignCh" val="l"/>
-            <dgm:param type="parTxRTLAlign" val="r"/>
-            <dgm:param type="shpTxRTLAlignCh" val="r"/>
-          </dgm:alg>
-          <dgm:shape xmlns:r="http://schemas.openxmlformats.org/officeDocument/2006/relationships" type="rect" r:blip="">
-            <dgm:adjLst/>
-          </dgm:shape>
-          <dgm:presOf axis="self" ptType="node"/>
-          <dgm:constrLst>
-            <dgm:constr type="lMarg" refType="h" fact="0.3"/>
-            <dgm:constr type="rMarg" refType="h" fact="0.3"/>
-            <dgm:constr type="tMarg" refType="h" fact="0.3"/>
-            <dgm:constr type="bMarg" refType="h" fact="0.3"/>
-          </dgm:constrLst>
-          <dgm:ruleLst>
-            <dgm:rule type="primFontSz" val="14" fact="NaN" max="NaN"/>
-            <dgm:rule type="h" val="INF" fact="NaN" max="NaN"/>
-          </dgm:ruleLst>
-        </dgm:layoutNode>
-        <dgm:choose name="Name12">
-          <dgm:if name="Name13" axis="ch" ptType="node" func="cnt" op="gte" val="1">
-            <dgm:layoutNode name="desTx" styleLbl="revTx">
-              <dgm:varLst/>
-              <dgm:alg type="tx">
-                <dgm:param type="txAnchorVertCh" val="mid"/>
-                <dgm:param type="parTxLTRAlign" val="l"/>
-                <dgm:param type="shpTxLTRAlignCh" val="l"/>
-                <dgm:param type="parTxRTLAlign" val="r"/>
-                <dgm:param type="shpTxRTLAlignCh" val="r"/>
-                <dgm:param type="stBulletLvl" val="0"/>
-              </dgm:alg>
-              <dgm:shape xmlns:r="http://schemas.openxmlformats.org/officeDocument/2006/relationships" type="rect" r:blip="">
-                <dgm:adjLst/>
-              </dgm:shape>
-              <dgm:presOf axis="des" ptType="node"/>
-              <dgm:constrLst>
-                <dgm:constr type="primFontSz" val="18"/>
-                <dgm:constr type="secFontSz" refType="primFontSz"/>
-                <dgm:constr type="lMarg" refType="h" fact="0.3"/>
-                <dgm:constr type="rMarg" refType="h" fact="0.3"/>
-                <dgm:constr type="tMarg" refType="h" fact="0.3"/>
-                <dgm:constr type="bMarg" refType="h" fact="0.3"/>
-              </dgm:constrLst>
-              <dgm:ruleLst>
-                <dgm:rule type="primFontSz" val="11" fact="NaN" max="NaN"/>
-              </dgm:ruleLst>
-            </dgm:layoutNode>
-          </dgm:if>
-          <dgm:else name="Name14"/>
-        </dgm:choose>
-      </dgm:layoutNode>
-      <dgm:forEach name="Name15" axis="followSib" ptType="sibTrans" cnt="1">
-        <dgm:layoutNode name="sibTrans">
-          <dgm:alg type="sp"/>
-          <dgm:shape xmlns:r="http://schemas.openxmlformats.org/officeDocument/2006/relationships" r:blip="">
-            <dgm:adjLst/>
-          </dgm:shape>
-          <dgm:presOf axis="self"/>
-          <dgm:constrLst/>
-          <dgm:ruleLst/>
-        </dgm:layoutNode>
-      </dgm:forEach>
-    </dgm:forEach>
-  </dgm:layoutNode>
-  <dgm:extLst>
-    <a:ext uri="{68A01E43-0DF5-4B5B-8FA6-DAF915123BFB}">
-      <dgm1612:lstStyle xmlns:dgm1612="http://schemas.microsoft.com/office/drawing/2016/12/diagram">
-        <a:lvl1pPr>
-          <a:lnSpc>
-            <a:spcPct val="100000"/>
-          </a:lnSpc>
-        </a:lvl1pPr>
-        <a:lvl2pPr>
-          <a:lnSpc>
-            <a:spcPct val="100000"/>
-          </a:lnSpc>
-        </a:lvl2pPr>
-      </dgm1612:lstStyle>
-    </a:ext>
-  </dgm:extLst>
-</dgm:layoutDef>
-</file>
-
-<file path=ppt/diagrams/quickStyle1.xml><?xml version="1.0" encoding="utf-8"?>
-<dgm:styleDef xmlns:dgm="http://schemas.openxmlformats.org/drawingml/2006/diagram" xmlns:a="http://schemas.openxmlformats.org/drawingml/2006/main" uniqueId="urn:microsoft.com/office/officeart/2005/8/quickstyle/simple4">
-  <dgm:title val=""/>
-  <dgm:desc val=""/>
-  <dgm:catLst>
-    <dgm:cat type="simple" pri="10400"/>
-  </dgm:catLst>
-  <dgm:scene3d>
-    <a:camera prst="orthographicFront"/>
-    <a:lightRig rig="threePt" dir="t"/>
-  </dgm:scene3d>
-  <dgm:styleLbl name="node0">
-    <dgm:scene3d>
-      <a:camera prst="orthographicFront"/>
-      <a:lightRig rig="threePt" dir="t"/>
-    </dgm:scene3d>
-    <dgm:sp3d/>
-    <dgm:txPr/>
-    <dgm:style>
-      <a:lnRef idx="0">
-        <a:scrgbClr r="0" g="0" b="0"/>
-      </a:lnRef>
-      <a:fillRef idx="3">
-        <a:scrgbClr r="0" g="0" b="0"/>
-      </a:fillRef>
-      <a:effectRef idx="2">
-        <a:scrgbClr r="0" g="0" b="0"/>
-      </a:effectRef>
-      <a:fontRef idx="minor">
-        <a:schemeClr val="lt1"/>
-      </a:fontRef>
-    </dgm:style>
-  </dgm:styleLbl>
-  <dgm:styleLbl name="lnNode1">
-    <dgm:scene3d>
-      <a:camera prst="orthographicFront"/>
-      <a:lightRig rig="threePt" dir="t"/>
-    </dgm:scene3d>
-    <dgm:sp3d/>
-    <dgm:txPr/>
-    <dgm:style>
-      <a:lnRef idx="1">
-        <a:scrgbClr r="0" g="0" b="0"/>
-      </a:lnRef>
-      <a:fillRef idx="3">
-        <a:scrgbClr r="0" g="0" b="0"/>
-      </a:fillRef>
-      <a:effectRef idx="2">
-        <a:scrgbClr r="0" g="0" b="0"/>
-      </a:effectRef>
-      <a:fontRef idx="minor">
-        <a:schemeClr val="lt1"/>
-      </a:fontRef>
-    </dgm:style>
-  </dgm:styleLbl>
-  <dgm:styleLbl name="vennNode1">
-    <dgm:scene3d>
-      <a:camera prst="orthographicFront"/>
-      <a:lightRig rig="threePt" dir="t"/>
-    </dgm:scene3d>
-    <dgm:sp3d/>
-    <dgm:txPr/>
-    <dgm:style>
-      <a:lnRef idx="0">
-        <a:scrgbClr r="0" g="0" b="0"/>
-      </a:lnRef>
-      <a:fillRef idx="3">
-        <a:scrgbClr r="0" g="0" b="0"/>
-      </a:fillRef>
-      <a:effectRef idx="0">
-        <a:scrgbClr r="0" g="0" b="0"/>
-      </a:effectRef>
-      <a:fontRef idx="minor">
-        <a:schemeClr val="tx1"/>
-      </a:fontRef>
-    </dgm:style>
-  </dgm:styleLbl>
-  <dgm:styleLbl name="alignNode1">
-    <dgm:scene3d>
-      <a:camera prst="orthographicFront"/>
-      <a:lightRig rig="threePt" dir="t"/>
-    </dgm:scene3d>
-    <dgm:sp3d/>
-    <dgm:txPr/>
-    <dgm:style>
-      <a:lnRef idx="1">
-        <a:scrgbClr r="0" g="0" b="0"/>
-      </a:lnRef>
-      <a:fillRef idx="3">
-        <a:scrgbClr r="0" g="0" b="0"/>
-      </a:fillRef>
-      <a:effectRef idx="2">
-        <a:scrgbClr r="0" g="0" b="0"/>
-      </a:effectRef>
-      <a:fontRef idx="minor">
-        <a:schemeClr val="lt1"/>
-      </a:fontRef>
-    </dgm:style>
-  </dgm:styleLbl>
-  <dgm:styleLbl name="node1">
-    <dgm:scene3d>
-      <a:camera prst="orthographicFront"/>
-      <a:lightRig rig="threePt" dir="t"/>
-    </dgm:scene3d>
-    <dgm:sp3d/>
-    <dgm:txPr/>
-    <dgm:style>
-      <a:lnRef idx="0">
-        <a:scrgbClr r="0" g="0" b="0"/>
-      </a:lnRef>
-      <a:fillRef idx="3">
-        <a:scrgbClr r="0" g="0" b="0"/>
-      </a:fillRef>
-      <a:effectRef idx="2">
-        <a:scrgbClr r="0" g="0" b="0"/>
-      </a:effectRef>
-      <a:fontRef idx="minor">
-        <a:schemeClr val="lt1"/>
-      </a:fontRef>
-    </dgm:style>
-  </dgm:styleLbl>
-  <dgm:styleLbl name="node2">
-    <dgm:scene3d>
-      <a:camera prst="orthographicFront"/>
-      <a:lightRig rig="threePt" dir="t"/>
-    </dgm:scene3d>
-    <dgm:sp3d/>
-    <dgm:txPr/>
-    <dgm:style>
-      <a:lnRef idx="0">
-        <a:scrgbClr r="0" g="0" b="0"/>
-      </a:lnRef>
-      <a:fillRef idx="3">
-        <a:scrgbClr r="0" g="0" b="0"/>
-      </a:fillRef>
-      <a:effectRef idx="2">
-        <a:scrgbClr r="0" g="0" b="0"/>
-      </a:effectRef>
-      <a:fontRef idx="minor">
-        <a:schemeClr val="lt1"/>
-      </a:fontRef>
-    </dgm:style>
-  </dgm:styleLbl>
-  <dgm:styleLbl name="node3">
-    <dgm:scene3d>
-      <a:camera prst="orthographicFront"/>
-      <a:lightRig rig="threePt" dir="t"/>
-    </dgm:scene3d>
-    <dgm:sp3d/>
-    <dgm:txPr/>
-    <dgm:style>
-      <a:lnRef idx="0">
-        <a:scrgbClr r="0" g="0" b="0"/>
-      </a:lnRef>
-      <a:fillRef idx="3">
-        <a:scrgbClr r="0" g="0" b="0"/>
-      </a:fillRef>
-      <a:effectRef idx="2">
-        <a:scrgbClr r="0" g="0" b="0"/>
-      </a:effectRef>
-      <a:fontRef idx="minor">
-        <a:schemeClr val="lt1"/>
-      </a:fontRef>
-    </dgm:style>
-  </dgm:styleLbl>
-  <dgm:styleLbl name="node4">
-    <dgm:scene3d>
-      <a:camera prst="orthographicFront"/>
-      <a:lightRig rig="threePt" dir="t"/>
-    </dgm:scene3d>
-    <dgm:sp3d/>
-    <dgm:txPr/>
-    <dgm:style>
-      <a:lnRef idx="0">
-        <a:scrgbClr r="0" g="0" b="0"/>
-      </a:lnRef>
-      <a:fillRef idx="3">
-        <a:scrgbClr r="0" g="0" b="0"/>
-      </a:fillRef>
-      <a:effectRef idx="2">
-        <a:scrgbClr r="0" g="0" b="0"/>
-      </a:effectRef>
-      <a:fontRef idx="minor">
-        <a:schemeClr val="lt1"/>
-      </a:fontRef>
-    </dgm:style>
-  </dgm:styleLbl>
-  <dgm:styleLbl name="fgImgPlace1">
-    <dgm:scene3d>
-      <a:camera prst="orthographicFront"/>
-      <a:lightRig rig="threePt" dir="t"/>
-    </dgm:scene3d>
-    <dgm:sp3d/>
-    <dgm:txPr/>
-    <dgm:style>
-      <a:lnRef idx="0">
-        <a:scrgbClr r="0" g="0" b="0"/>
-      </a:lnRef>
-      <a:fillRef idx="1">
-        <a:scrgbClr r="0" g="0" b="0"/>
-      </a:fillRef>
-      <a:effectRef idx="2">
-        <a:scrgbClr r="0" g="0" b="0"/>
-      </a:effectRef>
-      <a:fontRef idx="minor"/>
-    </dgm:style>
-  </dgm:styleLbl>
-  <dgm:styleLbl name="alignImgPlace1">
-    <dgm:scene3d>
-      <a:camera prst="orthographicFront"/>
-      <a:lightRig rig="threePt" dir="t"/>
-    </dgm:scene3d>
-    <dgm:sp3d/>
-    <dgm:txPr/>
-    <dgm:style>
-      <a:lnRef idx="0">
-        <a:scrgbClr r="0" g="0" b="0"/>
-      </a:lnRef>
-      <a:fillRef idx="1">
-        <a:scrgbClr r="0" g="0" b="0"/>
-      </a:fillRef>
-      <a:effectRef idx="2">
-        <a:scrgbClr r="0" g="0" b="0"/>
-      </a:effectRef>
-      <a:fontRef idx="minor"/>
-    </dgm:style>
-  </dgm:styleLbl>
-  <dgm:styleLbl name="bgImgPlace1">
-    <dgm:scene3d>
-      <a:camera prst="orthographicFront"/>
-      <a:lightRig rig="threePt" dir="t"/>
-    </dgm:scene3d>
-    <dgm:sp3d/>
-    <dgm:txPr/>
-    <dgm:style>
-      <a:lnRef idx="0">
-        <a:scrgbClr r="0" g="0" b="0"/>
-      </a:lnRef>
-      <a:fillRef idx="1">
-        <a:scrgbClr r="0" g="0" b="0"/>
-      </a:fillRef>
-      <a:effectRef idx="2">
-        <a:scrgbClr r="0" g="0" b="0"/>
-      </a:effectRef>
-      <a:fontRef idx="minor"/>
-    </dgm:style>
-  </dgm:styleLbl>
-  <dgm:styleLbl name="sibTrans2D1">
-    <dgm:scene3d>
-      <a:camera prst="orthographicFront"/>
-      <a:lightRig rig="threePt" dir="t"/>
-    </dgm:scene3d>
-    <dgm:sp3d/>
-    <dgm:txPr/>
-    <dgm:style>
-      <a:lnRef idx="0">
-        <a:scrgbClr r="0" g="0" b="0"/>
-      </a:lnRef>
-      <a:fillRef idx="3">
-        <a:scrgbClr r="0" g="0" b="0"/>
-      </a:fillRef>
-      <a:effectRef idx="2">
-        <a:scrgbClr r="0" g="0" b="0"/>
-      </a:effectRef>
-      <a:fontRef idx="minor">
-        <a:schemeClr val="lt1"/>
-      </a:fontRef>
-    </dgm:style>
-  </dgm:styleLbl>
-  <dgm:styleLbl name="fgSibTrans2D1">
-    <dgm:scene3d>
-      <a:camera prst="orthographicFront"/>
-      <a:lightRig rig="threePt" dir="t"/>
-    </dgm:scene3d>
-    <dgm:sp3d/>
-    <dgm:txPr/>
-    <dgm:style>
-      <a:lnRef idx="0">
-        <a:scrgbClr r="0" g="0" b="0"/>
-      </a:lnRef>
-      <a:fillRef idx="3">
-        <a:scrgbClr r="0" g="0" b="0"/>
-      </a:fillRef>
-      <a:effectRef idx="2">
-        <a:scrgbClr r="0" g="0" b="0"/>
-      </a:effectRef>
-      <a:fontRef idx="minor">
-        <a:schemeClr val="lt1"/>
-      </a:fontRef>
-    </dgm:style>
-  </dgm:styleLbl>
-  <dgm:styleLbl name="bgSibTrans2D1">
-    <dgm:scene3d>
-      <a:camera prst="orthographicFront"/>
-      <a:lightRig rig="threePt" dir="t"/>
-    </dgm:scene3d>
-    <dgm:sp3d/>
-    <dgm:txPr/>
-    <dgm:style>
-      <a:lnRef idx="0">
-        <a:scrgbClr r="0" g="0" b="0"/>
-      </a:lnRef>
-      <a:fillRef idx="3">
-        <a:scrgbClr r="0" g="0" b="0"/>
-      </a:fillRef>
-      <a:effectRef idx="2">
-        <a:scrgbClr r="0" g="0" b="0"/>
-      </a:effectRef>
-      <a:fontRef idx="minor">
-        <a:schemeClr val="lt1"/>
-      </a:fontRef>
-    </dgm:style>
-  </dgm:styleLbl>
-  <dgm:styleLbl name="sibTrans1D1">
-    <dgm:scene3d>
-      <a:camera prst="orthographicFront"/>
-      <a:lightRig rig="threePt" dir="t"/>
-    </dgm:scene3d>
-    <dgm:sp3d/>
-    <dgm:txPr/>
-    <dgm:style>
-      <a:lnRef idx="1">
-        <a:scrgbClr r="0" g="0" b="0"/>
-      </a:lnRef>
-      <a:fillRef idx="0">
-        <a:scrgbClr r="0" g="0" b="0"/>
-      </a:fillRef>
-      <a:effectRef idx="0">
-        <a:scrgbClr r="0" g="0" b="0"/>
-      </a:effectRef>
-      <a:fontRef idx="minor"/>
-    </dgm:style>
-  </dgm:styleLbl>
-  <dgm:styleLbl name="callout">
-    <dgm:scene3d>
-      <a:camera prst="orthographicFront"/>
-      <a:lightRig rig="threePt" dir="t"/>
-    </dgm:scene3d>
-    <dgm:sp3d/>
-    <dgm:txPr/>
-    <dgm:style>
-      <a:lnRef idx="2">
-        <a:scrgbClr r="0" g="0" b="0"/>
-      </a:lnRef>
-      <a:fillRef idx="1">
-        <a:scrgbClr r="0" g="0" b="0"/>
-      </a:fillRef>
-      <a:effectRef idx="1">
-        <a:scrgbClr r="0" g="0" b="0"/>
-      </a:effectRef>
-      <a:fontRef idx="minor"/>
-    </dgm:style>
-  </dgm:styleLbl>
-  <dgm:styleLbl name="asst0">
-    <dgm:scene3d>
-      <a:camera prst="orthographicFront"/>
-      <a:lightRig rig="threePt" dir="t"/>
-    </dgm:scene3d>
-    <dgm:sp3d/>
-    <dgm:txPr/>
-    <dgm:style>
-      <a:lnRef idx="0">
-        <a:scrgbClr r="0" g="0" b="0"/>
-      </a:lnRef>
-      <a:fillRef idx="3">
-        <a:scrgbClr r="0" g="0" b="0"/>
-      </a:fillRef>
-      <a:effectRef idx="2">
-        <a:scrgbClr r="0" g="0" b="0"/>
-      </a:effectRef>
-      <a:fontRef idx="minor">
-        <a:schemeClr val="lt1"/>
-      </a:fontRef>
-    </dgm:style>
-  </dgm:styleLbl>
-  <dgm:styleLbl name="asst1">
-    <dgm:scene3d>
-      <a:camera prst="orthographicFront"/>
-      <a:lightRig rig="threePt" dir="t"/>
-    </dgm:scene3d>
-    <dgm:sp3d/>
-    <dgm:txPr/>
-    <dgm:style>
-      <a:lnRef idx="0">
-        <a:scrgbClr r="0" g="0" b="0"/>
-      </a:lnRef>
-      <a:fillRef idx="3">
-        <a:scrgbClr r="0" g="0" b="0"/>
-      </a:fillRef>
-      <a:effectRef idx="2">
-        <a:scrgbClr r="0" g="0" b="0"/>
-      </a:effectRef>
-      <a:fontRef idx="minor">
-        <a:schemeClr val="lt1"/>
-      </a:fontRef>
-    </dgm:style>
-  </dgm:styleLbl>
-  <dgm:styleLbl name="asst2">
-    <dgm:scene3d>
-      <a:camera prst="orthographicFront"/>
-      <a:lightRig rig="threePt" dir="t"/>
-    </dgm:scene3d>
-    <dgm:sp3d/>
-    <dgm:txPr/>
-    <dgm:style>
-      <a:lnRef idx="0">
-        <a:scrgbClr r="0" g="0" b="0"/>
-      </a:lnRef>
-      <a:fillRef idx="3">
-        <a:scrgbClr r="0" g="0" b="0"/>
-      </a:fillRef>
-      <a:effectRef idx="2">
-        <a:scrgbClr r="0" g="0" b="0"/>
-      </a:effectRef>
-      <a:fontRef idx="minor">
-        <a:schemeClr val="lt1"/>
-      </a:fontRef>
-    </dgm:style>
-  </dgm:styleLbl>
-  <dgm:styleLbl name="asst3">
-    <dgm:scene3d>
-      <a:camera prst="orthographicFront"/>
-      <a:lightRig rig="threePt" dir="t"/>
-    </dgm:scene3d>
-    <dgm:sp3d/>
-    <dgm:txPr/>
-    <dgm:style>
-      <a:lnRef idx="0">
-        <a:scrgbClr r="0" g="0" b="0"/>
-      </a:lnRef>
-      <a:fillRef idx="3">
-        <a:scrgbClr r="0" g="0" b="0"/>
-      </a:fillRef>
-      <a:effectRef idx="2">
-        <a:scrgbClr r="0" g="0" b="0"/>
-      </a:effectRef>
-      <a:fontRef idx="minor">
-        <a:schemeClr val="lt1"/>
-      </a:fontRef>
-    </dgm:style>
-  </dgm:styleLbl>
-  <dgm:styleLbl name="asst4">
-    <dgm:scene3d>
-      <a:camera prst="orthographicFront"/>
-      <a:lightRig rig="threePt" dir="t"/>
-    </dgm:scene3d>
-    <dgm:sp3d/>
-    <dgm:txPr/>
-    <dgm:style>
-      <a:lnRef idx="0">
-        <a:scrgbClr r="0" g="0" b="0"/>
-      </a:lnRef>
-      <a:fillRef idx="3">
-        <a:scrgbClr r="0" g="0" b="0"/>
-      </a:fillRef>
-      <a:effectRef idx="2">
-        <a:scrgbClr r="0" g="0" b="0"/>
-      </a:effectRef>
-      <a:fontRef idx="minor">
-        <a:schemeClr val="lt1"/>
-      </a:fontRef>
-    </dgm:style>
-  </dgm:styleLbl>
-  <dgm:styleLbl name="parChTrans2D1">
-    <dgm:scene3d>
-      <a:camera prst="orthographicFront"/>
-      <a:lightRig rig="threePt" dir="t"/>
-    </dgm:scene3d>
-    <dgm:sp3d/>
-    <dgm:txPr/>
-    <dgm:style>
-      <a:lnRef idx="0">
-        <a:scrgbClr r="0" g="0" b="0"/>
-      </a:lnRef>
-      <a:fillRef idx="3">
-        <a:scrgbClr r="0" g="0" b="0"/>
-      </a:fillRef>
-      <a:effectRef idx="2">
-        <a:scrgbClr r="0" g="0" b="0"/>
-      </a:effectRef>
-      <a:fontRef idx="minor">
-        <a:schemeClr val="lt1"/>
-      </a:fontRef>
-    </dgm:style>
-  </dgm:styleLbl>
-  <dgm:styleLbl name="parChTrans2D2">
-    <dgm:scene3d>
-      <a:camera prst="orthographicFront"/>
-      <a:lightRig rig="threePt" dir="t"/>
-    </dgm:scene3d>
-    <dgm:sp3d/>
-    <dgm:txPr/>
-    <dgm:style>
-      <a:lnRef idx="0">
-        <a:scrgbClr r="0" g="0" b="0"/>
-      </a:lnRef>
-      <a:fillRef idx="3">
-        <a:scrgbClr r="0" g="0" b="0"/>
-      </a:fillRef>
-      <a:effectRef idx="2">
-        <a:scrgbClr r="0" g="0" b="0"/>
-      </a:effectRef>
-      <a:fontRef idx="minor">
-        <a:schemeClr val="lt1"/>
-      </a:fontRef>
-    </dgm:style>
-  </dgm:styleLbl>
-  <dgm:styleLbl name="parChTrans2D3">
-    <dgm:scene3d>
-      <a:camera prst="orthographicFront"/>
-      <a:lightRig rig="threePt" dir="t"/>
-    </dgm:scene3d>
-    <dgm:sp3d/>
-    <dgm:txPr/>
-    <dgm:style>
-      <a:lnRef idx="1">
-        <a:scrgbClr r="0" g="0" b="0"/>
-      </a:lnRef>
-      <a:fillRef idx="3">
-        <a:scrgbClr r="0" g="0" b="0"/>
-      </a:fillRef>
-      <a:effectRef idx="2">
-        <a:scrgbClr r="0" g="0" b="0"/>
-      </a:effectRef>
-      <a:fontRef idx="minor">
-        <a:schemeClr val="lt1"/>
-      </a:fontRef>
-    </dgm:style>
-  </dgm:styleLbl>
-  <dgm:styleLbl name="parChTrans2D4">
-    <dgm:scene3d>
-      <a:camera prst="orthographicFront"/>
-      <a:lightRig rig="threePt" dir="t"/>
-    </dgm:scene3d>
-    <dgm:sp3d/>
-    <dgm:txPr/>
-    <dgm:style>
-      <a:lnRef idx="1">
-        <a:scrgbClr r="0" g="0" b="0"/>
-      </a:lnRef>
-      <a:fillRef idx="3">
-        <a:scrgbClr r="0" g="0" b="0"/>
-      </a:fillRef>
-      <a:effectRef idx="2">
-        <a:scrgbClr r="0" g="0" b="0"/>
-      </a:effectRef>
-      <a:fontRef idx="minor">
-        <a:schemeClr val="lt1"/>
-      </a:fontRef>
-    </dgm:style>
-  </dgm:styleLbl>
-  <dgm:styleLbl name="parChTrans1D1">
-    <dgm:scene3d>
-      <a:camera prst="orthographicFront"/>
-      <a:lightRig rig="threePt" dir="t"/>
-    </dgm:scene3d>
-    <dgm:sp3d/>
-    <dgm:txPr/>
-    <dgm:style>
-      <a:lnRef idx="1">
-        <a:scrgbClr r="0" g="0" b="0"/>
-      </a:lnRef>
-      <a:fillRef idx="0">
-        <a:scrgbClr r="0" g="0" b="0"/>
-      </a:fillRef>
-      <a:effectRef idx="0">
-        <a:scrgbClr r="0" g="0" b="0"/>
-      </a:effectRef>
-      <a:fontRef idx="minor"/>
-    </dgm:style>
-  </dgm:styleLbl>
-  <dgm:styleLbl name="parChTrans1D2">
-    <dgm:scene3d>
-      <a:camera prst="orthographicFront"/>
-      <a:lightRig rig="threePt" dir="t"/>
-    </dgm:scene3d>
-    <dgm:sp3d/>
-    <dgm:txPr/>
-    <dgm:style>
-      <a:lnRef idx="1">
-        <a:scrgbClr r="0" g="0" b="0"/>
-      </a:lnRef>
-      <a:fillRef idx="0">
-        <a:scrgbClr r="0" g="0" b="0"/>
-      </a:fillRef>
-      <a:effectRef idx="0">
-        <a:scrgbClr r="0" g="0" b="0"/>
-      </a:effectRef>
-      <a:fontRef idx="minor"/>
-    </dgm:style>
-  </dgm:styleLbl>
-  <dgm:styleLbl name="parChTrans1D3">
-    <dgm:scene3d>
-      <a:camera prst="orthographicFront"/>
-      <a:lightRig rig="threePt" dir="t"/>
-    </dgm:scene3d>
-    <dgm:sp3d/>
-    <dgm:txPr/>
-    <dgm:style>
-      <a:lnRef idx="1">
-        <a:scrgbClr r="0" g="0" b="0"/>
-      </a:lnRef>
-      <a:fillRef idx="0">
-        <a:scrgbClr r="0" g="0" b="0"/>
-      </a:fillRef>
-      <a:effectRef idx="0">
-        <a:scrgbClr r="0" g="0" b="0"/>
-      </a:effectRef>
-      <a:fontRef idx="minor"/>
-    </dgm:style>
-  </dgm:styleLbl>
-  <dgm:styleLbl name="parChTrans1D4">
-    <dgm:scene3d>
-      <a:camera prst="orthographicFront"/>
-      <a:lightRig rig="threePt" dir="t"/>
-    </dgm:scene3d>
-    <dgm:sp3d/>
-    <dgm:txPr/>
-    <dgm:style>
-      <a:lnRef idx="1">
-        <a:scrgbClr r="0" g="0" b="0"/>
-      </a:lnRef>
-      <a:fillRef idx="0">
-        <a:scrgbClr r="0" g="0" b="0"/>
-      </a:fillRef>
-      <a:effectRef idx="0">
-        <a:scrgbClr r="0" g="0" b="0"/>
-      </a:effectRef>
-      <a:fontRef idx="minor"/>
-    </dgm:style>
-  </dgm:styleLbl>
-  <dgm:styleLbl name="fgAcc1">
-    <dgm:scene3d>
-      <a:camera prst="orthographicFront"/>
-      <a:lightRig rig="threePt" dir="t"/>
-    </dgm:scene3d>
-    <dgm:sp3d/>
-    <dgm:txPr/>
-    <dgm:style>
-      <a:lnRef idx="1">
-        <a:scrgbClr r="0" g="0" b="0"/>
-      </a:lnRef>
-      <a:fillRef idx="1">
-        <a:scrgbClr r="0" g="0" b="0"/>
-      </a:fillRef>
-      <a:effectRef idx="0">
-        <a:scrgbClr r="0" g="0" b="0"/>
-      </a:effectRef>
-      <a:fontRef idx="minor"/>
-    </dgm:style>
-  </dgm:styleLbl>
-  <dgm:styleLbl name="conFgAcc1">
-    <dgm:scene3d>
-      <a:camera prst="orthographicFront"/>
-      <a:lightRig rig="threePt" dir="t"/>
-    </dgm:scene3d>
-    <dgm:sp3d/>
-    <dgm:txPr/>
-    <dgm:style>
-      <a:lnRef idx="1">
-        <a:scrgbClr r="0" g="0" b="0"/>
-      </a:lnRef>
-      <a:fillRef idx="1">
-        <a:scrgbClr r="0" g="0" b="0"/>
-      </a:fillRef>
-      <a:effectRef idx="0">
-        <a:scrgbClr r="0" g="0" b="0"/>
-      </a:effectRef>
-      <a:fontRef idx="minor"/>
-    </dgm:style>
-  </dgm:styleLbl>
-  <dgm:styleLbl name="alignAcc1">
-    <dgm:scene3d>
-      <a:camera prst="orthographicFront"/>
-      <a:lightRig rig="threePt" dir="t"/>
-    </dgm:scene3d>
-    <dgm:sp3d/>
-    <dgm:txPr/>
-    <dgm:style>
-      <a:lnRef idx="1">
-        <a:scrgbClr r="0" g="0" b="0"/>
-      </a:lnRef>
-      <a:fillRef idx="1">
-        <a:scrgbClr r="0" g="0" b="0"/>
-      </a:fillRef>
-      <a:effectRef idx="0">
-        <a:scrgbClr r="0" g="0" b="0"/>
-      </a:effectRef>
-      <a:fontRef idx="minor"/>
-    </dgm:style>
-  </dgm:styleLbl>
-  <dgm:styleLbl name="trAlignAcc1">
-    <dgm:scene3d>
-      <a:camera prst="orthographicFront"/>
-      <a:lightRig rig="threePt" dir="t"/>
-    </dgm:scene3d>
-    <dgm:sp3d/>
-    <dgm:txPr/>
-    <dgm:style>
-      <a:lnRef idx="1">
-        <a:scrgbClr r="0" g="0" b="0"/>
-      </a:lnRef>
-      <a:fillRef idx="1">
-        <a:scrgbClr r="0" g="0" b="0"/>
-      </a:fillRef>
-      <a:effectRef idx="0">
-        <a:scrgbClr r="0" g="0" b="0"/>
-      </a:effectRef>
-      <a:fontRef idx="minor"/>
-    </dgm:style>
-  </dgm:styleLbl>
-  <dgm:styleLbl name="bgAcc1">
-    <dgm:scene3d>
-      <a:camera prst="orthographicFront"/>
-      <a:lightRig rig="threePt" dir="t"/>
-    </dgm:scene3d>
-    <dgm:sp3d/>
-    <dgm:txPr/>
-    <dgm:style>
-      <a:lnRef idx="1">
-        <a:scrgbClr r="0" g="0" b="0"/>
-      </a:lnRef>
-      <a:fillRef idx="1">
-        <a:scrgbClr r="0" g="0" b="0"/>
-      </a:fillRef>
-      <a:effectRef idx="0">
-        <a:scrgbClr r="0" g="0" b="0"/>
-      </a:effectRef>
-      <a:fontRef idx="minor"/>
-    </dgm:style>
-  </dgm:styleLbl>
-  <dgm:styleLbl name="solidFgAcc1">
-    <dgm:scene3d>
-      <a:camera prst="orthographicFront"/>
-      <a:lightRig rig="threePt" dir="t"/>
-    </dgm:scene3d>
-    <dgm:sp3d/>
-    <dgm:txPr/>
-    <dgm:style>
-      <a:lnRef idx="1">
-        <a:scrgbClr r="0" g="0" b="0"/>
-      </a:lnRef>
-      <a:fillRef idx="1">
-        <a:scrgbClr r="0" g="0" b="0"/>
-      </a:fillRef>
-      <a:effectRef idx="0">
-        <a:scrgbClr r="0" g="0" b="0"/>
-      </a:effectRef>
-      <a:fontRef idx="minor"/>
-    </dgm:style>
-  </dgm:styleLbl>
-  <dgm:styleLbl name="solidAlignAcc1">
-    <dgm:scene3d>
-      <a:camera prst="orthographicFront"/>
-      <a:lightRig rig="threePt" dir="t"/>
-    </dgm:scene3d>
-    <dgm:sp3d/>
-    <dgm:txPr/>
-    <dgm:style>
-      <a:lnRef idx="1">
-        <a:scrgbClr r="0" g="0" b="0"/>
-      </a:lnRef>
-      <a:fillRef idx="1">
-        <a:scrgbClr r="0" g="0" b="0"/>
-      </a:fillRef>
-      <a:effectRef idx="0">
-        <a:scrgbClr r="0" g="0" b="0"/>
-      </a:effectRef>
-      <a:fontRef idx="minor"/>
-    </dgm:style>
-  </dgm:styleLbl>
-  <dgm:styleLbl name="solidBgAcc1">
-    <dgm:scene3d>
-      <a:camera prst="orthographicFront"/>
-      <a:lightRig rig="threePt" dir="t"/>
-    </dgm:scene3d>
-    <dgm:sp3d/>
-    <dgm:txPr/>
-    <dgm:style>
-      <a:lnRef idx="1">
-        <a:scrgbClr r="0" g="0" b="0"/>
-      </a:lnRef>
-      <a:fillRef idx="1">
-        <a:scrgbClr r="0" g="0" b="0"/>
-      </a:fillRef>
-      <a:effectRef idx="0">
-        <a:scrgbClr r="0" g="0" b="0"/>
-      </a:effectRef>
-      <a:fontRef idx="minor"/>
-    </dgm:style>
-  </dgm:styleLbl>
-  <dgm:styleLbl name="fgAccFollowNode1">
-    <dgm:scene3d>
-      <a:camera prst="orthographicFront"/>
-      <a:lightRig rig="threePt" dir="t"/>
-    </dgm:scene3d>
-    <dgm:sp3d/>
-    <dgm:txPr/>
-    <dgm:style>
-      <a:lnRef idx="1">
-        <a:scrgbClr r="0" g="0" b="0"/>
-      </a:lnRef>
-      <a:fillRef idx="1">
-        <a:scrgbClr r="0" g="0" b="0"/>
-      </a:fillRef>
-      <a:effectRef idx="0">
-        <a:scrgbClr r="0" g="0" b="0"/>
-      </a:effectRef>
-      <a:fontRef idx="minor"/>
-    </dgm:style>
-  </dgm:styleLbl>
-  <dgm:styleLbl name="alignAccFollowNode1">
-    <dgm:scene3d>
-      <a:camera prst="orthographicFront"/>
-      <a:lightRig rig="threePt" dir="t"/>
-    </dgm:scene3d>
-    <dgm:sp3d/>
-    <dgm:txPr/>
-    <dgm:style>
-      <a:lnRef idx="1">
-        <a:scrgbClr r="0" g="0" b="0"/>
-      </a:lnRef>
-      <a:fillRef idx="1">
-        <a:scrgbClr r="0" g="0" b="0"/>
-      </a:fillRef>
-      <a:effectRef idx="0">
-        <a:scrgbClr r="0" g="0" b="0"/>
-      </a:effectRef>
-      <a:fontRef idx="minor"/>
-    </dgm:style>
-  </dgm:styleLbl>
-  <dgm:styleLbl name="bgAccFollowNode1">
-    <dgm:scene3d>
-      <a:camera prst="orthographicFront"/>
-      <a:lightRig rig="threePt" dir="t"/>
-    </dgm:scene3d>
-    <dgm:sp3d/>
-    <dgm:txPr/>
-    <dgm:style>
-      <a:lnRef idx="1">
-        <a:scrgbClr r="0" g="0" b="0"/>
-      </a:lnRef>
-      <a:fillRef idx="1">
-        <a:scrgbClr r="0" g="0" b="0"/>
-      </a:fillRef>
-      <a:effectRef idx="0">
-        <a:scrgbClr r="0" g="0" b="0"/>
-      </a:effectRef>
-      <a:fontRef idx="minor"/>
-    </dgm:style>
-  </dgm:styleLbl>
-  <dgm:styleLbl name="fgAcc0">
-    <dgm:scene3d>
-      <a:camera prst="orthographicFront"/>
-      <a:lightRig rig="threePt" dir="t"/>
-    </dgm:scene3d>
-    <dgm:sp3d/>
-    <dgm:txPr/>
-    <dgm:style>
-      <a:lnRef idx="1">
-        <a:scrgbClr r="0" g="0" b="0"/>
-      </a:lnRef>
-      <a:fillRef idx="1">
-        <a:scrgbClr r="0" g="0" b="0"/>
-      </a:fillRef>
-      <a:effectRef idx="0">
-        <a:scrgbClr r="0" g="0" b="0"/>
-      </a:effectRef>
-      <a:fontRef idx="minor"/>
-    </dgm:style>
-  </dgm:styleLbl>
-  <dgm:styleLbl name="fgAcc2">
-    <dgm:scene3d>
-      <a:camera prst="orthographicFront"/>
-      <a:lightRig rig="threePt" dir="t"/>
-    </dgm:scene3d>
-    <dgm:sp3d/>
-    <dgm:txPr/>
-    <dgm:style>
-      <a:lnRef idx="1">
-        <a:scrgbClr r="0" g="0" b="0"/>
-      </a:lnRef>
-      <a:fillRef idx="1">
-        <a:scrgbClr r="0" g="0" b="0"/>
-      </a:fillRef>
-      <a:effectRef idx="0">
-        <a:scrgbClr r="0" g="0" b="0"/>
-      </a:effectRef>
-      <a:fontRef idx="minor"/>
-    </dgm:style>
-  </dgm:styleLbl>
-  <dgm:styleLbl name="fgAcc3">
-    <dgm:scene3d>
-      <a:camera prst="orthographicFront"/>
-      <a:lightRig rig="threePt" dir="t"/>
-    </dgm:scene3d>
-    <dgm:sp3d/>
-    <dgm:txPr/>
-    <dgm:style>
-      <a:lnRef idx="1">
-        <a:scrgbClr r="0" g="0" b="0"/>
-      </a:lnRef>
-      <a:fillRef idx="1">
-        <a:scrgbClr r="0" g="0" b="0"/>
-      </a:fillRef>
-      <a:effectRef idx="0">
-        <a:scrgbClr r="0" g="0" b="0"/>
-      </a:effectRef>
-      <a:fontRef idx="minor"/>
-    </dgm:style>
-  </dgm:styleLbl>
-  <dgm:styleLbl name="fgAcc4">
-    <dgm:scene3d>
-      <a:camera prst="orthographicFront"/>
-      <a:lightRig rig="threePt" dir="t"/>
-    </dgm:scene3d>
-    <dgm:sp3d/>
-    <dgm:txPr/>
-    <dgm:style>
-      <a:lnRef idx="1">
-        <a:scrgbClr r="0" g="0" b="0"/>
-      </a:lnRef>
-      <a:fillRef idx="1">
-        <a:scrgbClr r="0" g="0" b="0"/>
-      </a:fillRef>
-      <a:effectRef idx="0">
-        <a:scrgbClr r="0" g="0" b="0"/>
-      </a:effectRef>
-      <a:fontRef idx="minor"/>
-    </dgm:style>
-  </dgm:styleLbl>
-  <dgm:styleLbl name="bgShp">
-    <dgm:scene3d>
-      <a:camera prst="orthographicFront"/>
-      <a:lightRig rig="threePt" dir="t"/>
-    </dgm:scene3d>
-    <dgm:sp3d/>
-    <dgm:txPr/>
-    <dgm:style>
-      <a:lnRef idx="0">
-        <a:scrgbClr r="0" g="0" b="0"/>
-      </a:lnRef>
-      <a:fillRef idx="1">
-        <a:scrgbClr r="0" g="0" b="0"/>
-      </a:fillRef>
-      <a:effectRef idx="2">
-        <a:scrgbClr r="0" g="0" b="0"/>
-      </a:effectRef>
-      <a:fontRef idx="minor"/>
-    </dgm:style>
-  </dgm:styleLbl>
-  <dgm:styleLbl name="dkBgShp">
-    <dgm:scene3d>
-      <a:camera prst="orthographicFront"/>
-      <a:lightRig rig="threePt" dir="t"/>
-    </dgm:scene3d>
-    <dgm:sp3d/>
-    <dgm:txPr/>
-    <dgm:style>
-      <a:lnRef idx="0">
-        <a:scrgbClr r="0" g="0" b="0"/>
-      </a:lnRef>
-      <a:fillRef idx="1">
-        <a:scrgbClr r="0" g="0" b="0"/>
-      </a:fillRef>
-      <a:effectRef idx="2">
-        <a:scrgbClr r="0" g="0" b="0"/>
-      </a:effectRef>
-      <a:fontRef idx="minor"/>
-    </dgm:style>
-  </dgm:styleLbl>
-  <dgm:styleLbl name="trBgShp">
-    <dgm:scene3d>
-      <a:camera prst="orthographicFront"/>
-      <a:lightRig rig="threePt" dir="t"/>
-    </dgm:scene3d>
-    <dgm:sp3d/>
-    <dgm:txPr/>
-    <dgm:style>
-      <a:lnRef idx="0">
-        <a:scrgbClr r="0" g="0" b="0"/>
-      </a:lnRef>
-      <a:fillRef idx="1">
-        <a:scrgbClr r="0" g="0" b="0"/>
-      </a:fillRef>
-      <a:effectRef idx="0">
-        <a:scrgbClr r="0" g="0" b="0"/>
-      </a:effectRef>
-      <a:fontRef idx="minor"/>
-    </dgm:style>
-  </dgm:styleLbl>
-  <dgm:styleLbl name="fgShp">
-    <dgm:scene3d>
-      <a:camera prst="orthographicFront"/>
-      <a:lightRig rig="threePt" dir="t"/>
-    </dgm:scene3d>
-    <dgm:sp3d/>
-    <dgm:txPr/>
-    <dgm:style>
-      <a:lnRef idx="0">
-        <a:scrgbClr r="0" g="0" b="0"/>
-      </a:lnRef>
-      <a:fillRef idx="3">
-        <a:scrgbClr r="0" g="0" b="0"/>
-      </a:fillRef>
-      <a:effectRef idx="2">
-        <a:scrgbClr r="0" g="0" b="0"/>
-      </a:effectRef>
-      <a:fontRef idx="minor"/>
-    </dgm:style>
-  </dgm:styleLbl>
-  <dgm:styleLbl name="revTx">
-    <dgm:scene3d>
-      <a:camera prst="orthographicFront"/>
-      <a:lightRig rig="threePt" dir="t"/>
-    </dgm:scene3d>
-    <dgm:sp3d/>
-    <dgm:txPr/>
-    <dgm:style>
-      <a:lnRef idx="0">
-        <a:scrgbClr r="0" g="0" b="0"/>
-      </a:lnRef>
-      <a:fillRef idx="0">
-        <a:scrgbClr r="0" g="0" b="0"/>
-      </a:fillRef>
-      <a:effectRef idx="0">
-        <a:scrgbClr r="0" g="0" b="0"/>
-      </a:effectRef>
-      <a:fontRef idx="minor"/>
-    </dgm:style>
-  </dgm:styleLbl>
-</dgm:styleDef>
+        <a:latin typeface="+mn-lt"/>
+        <a:ea typeface="+mn-ea"/>
+        <a:cs typeface="+mn-cs"/>
+      </a:defRPr>
+    </a:lvl2pPr>
+    <a:lvl3pPr marL="914400" algn="l" defTabSz="914400" rtl="0" eaLnBrk="1" latinLnBrk="0" hangingPunct="1">
+      <a:defRPr sz="1200" kern="1200">
+        <a:solidFill>
+          <a:schemeClr val="tx1"/>
+        </a:solidFill>
+        <a:latin typeface="+mn-lt"/>
+        <a:ea typeface="+mn-ea"/>
+        <a:cs typeface="+mn-cs"/>
+      </a:defRPr>
+    </a:lvl3pPr>
+    <a:lvl4pPr marL="1371600" algn="l" defTabSz="914400" rtl="0" eaLnBrk="1" latinLnBrk="0" hangingPunct="1">
+      <a:defRPr sz="1200" kern="1200">
+        <a:solidFill>
+          <a:schemeClr val="tx1"/>
+        </a:solidFill>
+        <a:latin typeface="+mn-lt"/>
+        <a:ea typeface="+mn-ea"/>
+        <a:cs typeface="+mn-cs"/>
+      </a:defRPr>
+    </a:lvl4pPr>
+    <a:lvl5pPr marL="1828800" algn="l" defTabSz="914400" rtl="0" eaLnBrk="1" latinLnBrk="0" hangingPunct="1">
+      <a:defRPr sz="1200" kern="1200">
+        <a:solidFill>
+          <a:schemeClr val="tx1"/>
+        </a:solidFill>
+        <a:latin typeface="+mn-lt"/>
+        <a:ea typeface="+mn-ea"/>
+        <a:cs typeface="+mn-cs"/>
+      </a:defRPr>
+    </a:lvl5pPr>
+    <a:lvl6pPr marL="2286000" algn="l" defTabSz="914400" rtl="0" eaLnBrk="1" latinLnBrk="0" hangingPunct="1">
+      <a:defRPr sz="1200" kern="1200">
+        <a:solidFill>
+          <a:schemeClr val="tx1"/>
+        </a:solidFill>
+        <a:latin typeface="+mn-lt"/>
+        <a:ea typeface="+mn-ea"/>
+        <a:cs typeface="+mn-cs"/>
+      </a:defRPr>
+    </a:lvl6pPr>
+    <a:lvl7pPr marL="2743200" algn="l" defTabSz="914400" rtl="0" eaLnBrk="1" latinLnBrk="0" hangingPunct="1">
+      <a:defRPr sz="1200" kern="1200">
+        <a:solidFill>
+          <a:schemeClr val="tx1"/>
+        </a:solidFill>
+        <a:latin typeface="+mn-lt"/>
+        <a:ea typeface="+mn-ea"/>
+        <a:cs typeface="+mn-cs"/>
+      </a:defRPr>
+    </a:lvl7pPr>
+    <a:lvl8pPr marL="3200400" algn="l" defTabSz="914400" rtl="0" eaLnBrk="1" latinLnBrk="0" hangingPunct="1">
+      <a:defRPr sz="1200" kern="1200">
+        <a:solidFill>
+          <a:schemeClr val="tx1"/>
+        </a:solidFill>
+        <a:latin typeface="+mn-lt"/>
+        <a:ea typeface="+mn-ea"/>
+        <a:cs typeface="+mn-cs"/>
+      </a:defRPr>
+    </a:lvl8pPr>
+    <a:lvl9pPr marL="3657600" algn="l" defTabSz="914400" rtl="0" eaLnBrk="1" latinLnBrk="0" hangingPunct="1">
+      <a:defRPr sz="1200" kern="1200">
+        <a:solidFill>
+          <a:schemeClr val="tx1"/>
+        </a:solidFill>
+        <a:latin typeface="+mn-lt"/>
+        <a:ea typeface="+mn-ea"/>
+        <a:cs typeface="+mn-cs"/>
+      </a:defRPr>
+    </a:lvl9pPr>
+  </p:notesStyle>
+</p:notesMaster>
 </file>
 
 <file path=ppt/slideLayouts/slideLayout1.xml><?xml version="1.0" encoding="utf-8"?>
@@ -9325,18 +6680,13 @@
           <a:p>
             <a:pPr algn="l"/>
             <a:r>
-              <a:rPr lang="en-US" sz="4400">
+              <a:rPr lang="en-US" sz="4400" dirty="0">
                 <a:solidFill>
                   <a:schemeClr val="bg1"/>
                 </a:solidFill>
               </a:rPr>
-              <a:t>What’s in my cluster? (via yaml file)</a:t>
-            </a:r>
-            <a:endParaRPr lang="en-US" sz="4400" dirty="0">
-              <a:solidFill>
-                <a:schemeClr val="bg1"/>
-              </a:solidFill>
-            </a:endParaRPr>
+              <a:t>What’s a YAML file?</a:t>
+            </a:r>
           </a:p>
         </p:txBody>
       </p:sp>
@@ -9428,37 +6778,406 @@
           </a:prstGeom>
         </p:spPr>
       </p:pic>
-      <p:graphicFrame>
-        <p:nvGraphicFramePr>
-          <p:cNvPr id="16" name="Content Placeholder 2">
+      <p:sp>
+        <p:nvSpPr>
+          <p:cNvPr id="6" name="TextBox 5">
             <a:extLst>
               <a:ext uri="{FF2B5EF4-FFF2-40B4-BE49-F238E27FC236}">
-                <a16:creationId xmlns:a16="http://schemas.microsoft.com/office/drawing/2014/main" id="{7887EC40-DA23-46D3-AA7C-2326C4C1E31E}"/>
+                <a16:creationId xmlns:a16="http://schemas.microsoft.com/office/drawing/2014/main" id="{6E05123E-183D-114D-9FCB-14DE070EDCA4}"/>
               </a:ext>
             </a:extLst>
           </p:cNvPr>
-          <p:cNvGraphicFramePr>
-            <a:graphicFrameLocks noGrp="1"/>
-          </p:cNvGraphicFramePr>
-          <p:nvPr>
-            <p:ph sz="quarter" idx="13"/>
-            <p:extLst>
-              <p:ext uri="{D42A27DB-BD31-4B8C-83A1-F6EECF244321}">
-                <p14:modId xmlns:p14="http://schemas.microsoft.com/office/powerpoint/2010/main" val="2968898478"/>
-              </p:ext>
-            </p:extLst>
-          </p:nvPr>
-        </p:nvGraphicFramePr>
-        <p:xfrm>
-          <a:off x="4594225" y="889000"/>
-          <a:ext cx="6683375" cy="4606925"/>
-        </p:xfrm>
-        <a:graphic>
-          <a:graphicData uri="http://schemas.openxmlformats.org/drawingml/2006/diagram">
-            <dgm:relIds xmlns:dgm="http://schemas.openxmlformats.org/drawingml/2006/diagram" xmlns:r="http://schemas.openxmlformats.org/officeDocument/2006/relationships" r:dm="rId4" r:lo="rId5" r:qs="rId6" r:cs="rId7"/>
-          </a:graphicData>
-        </a:graphic>
-      </p:graphicFrame>
+          <p:cNvSpPr txBox="1"/>
+          <p:nvPr/>
+        </p:nvSpPr>
+        <p:spPr>
+          <a:xfrm>
+            <a:off x="8392592" y="950097"/>
+            <a:ext cx="3286897" cy="1477328"/>
+          </a:xfrm>
+          <a:prstGeom prst="rect">
+            <a:avLst/>
+          </a:prstGeom>
+          <a:noFill/>
+        </p:spPr>
+        <p:txBody>
+          <a:bodyPr wrap="square" rtlCol="0">
+            <a:spAutoFit/>
+          </a:bodyPr>
+          <a:lstStyle/>
+          <a:p>
+            <a:r>
+              <a:rPr lang="en-US" dirty="0"/>
+              <a:t>Four Required elements:</a:t>
+            </a:r>
+          </a:p>
+          <a:p>
+            <a:pPr marL="342900" indent="-342900">
+              <a:buAutoNum type="arabicPeriod"/>
+            </a:pPr>
+            <a:r>
+              <a:rPr lang="en-US" dirty="0" err="1"/>
+              <a:t>apiVersion</a:t>
+            </a:r>
+            <a:endParaRPr lang="en-US" dirty="0"/>
+          </a:p>
+          <a:p>
+            <a:pPr marL="342900" indent="-342900">
+              <a:buAutoNum type="arabicPeriod"/>
+            </a:pPr>
+            <a:r>
+              <a:rPr lang="en-US" dirty="0"/>
+              <a:t>kind</a:t>
+            </a:r>
+          </a:p>
+          <a:p>
+            <a:pPr marL="342900" indent="-342900">
+              <a:buAutoNum type="arabicPeriod"/>
+            </a:pPr>
+            <a:r>
+              <a:rPr lang="en-US" dirty="0"/>
+              <a:t>metadata</a:t>
+            </a:r>
+          </a:p>
+          <a:p>
+            <a:pPr marL="342900" indent="-342900">
+              <a:buAutoNum type="arabicPeriod"/>
+            </a:pPr>
+            <a:r>
+              <a:rPr lang="en-US" dirty="0"/>
+              <a:t>spec</a:t>
+            </a:r>
+          </a:p>
+        </p:txBody>
+      </p:sp>
+      <p:sp>
+        <p:nvSpPr>
+          <p:cNvPr id="13" name="TextBox 12">
+            <a:extLst>
+              <a:ext uri="{FF2B5EF4-FFF2-40B4-BE49-F238E27FC236}">
+                <a16:creationId xmlns:a16="http://schemas.microsoft.com/office/drawing/2014/main" id="{2233D3D2-5AB8-D14D-BF2C-5F7EF1D645F6}"/>
+              </a:ext>
+            </a:extLst>
+          </p:cNvPr>
+          <p:cNvSpPr txBox="1"/>
+          <p:nvPr/>
+        </p:nvSpPr>
+        <p:spPr>
+          <a:xfrm>
+            <a:off x="8392592" y="2630625"/>
+            <a:ext cx="3286897" cy="3139321"/>
+          </a:xfrm>
+          <a:prstGeom prst="rect">
+            <a:avLst/>
+          </a:prstGeom>
+          <a:noFill/>
+        </p:spPr>
+        <p:txBody>
+          <a:bodyPr wrap="square" rtlCol="0">
+            <a:spAutoFit/>
+          </a:bodyPr>
+          <a:lstStyle/>
+          <a:p>
+            <a:r>
+              <a:rPr lang="en-US" dirty="0"/>
+              <a:t>Indentations show parent/child relationships</a:t>
+            </a:r>
+          </a:p>
+          <a:p>
+            <a:endParaRPr lang="en-US" dirty="0"/>
+          </a:p>
+          <a:p>
+            <a:r>
+              <a:rPr lang="en-US" dirty="0"/>
+              <a:t>The number of spaces don’t matter, just be consistent</a:t>
+            </a:r>
+          </a:p>
+          <a:p>
+            <a:endParaRPr lang="en-US" dirty="0"/>
+          </a:p>
+          <a:p>
+            <a:r>
+              <a:rPr lang="en-US" dirty="0"/>
+              <a:t>Image and name are siblings, and both are children of containers</a:t>
+            </a:r>
+          </a:p>
+          <a:p>
+            <a:endParaRPr lang="en-US" dirty="0"/>
+          </a:p>
+          <a:p>
+            <a:r>
+              <a:rPr lang="en-US" dirty="0"/>
+              <a:t>The “-” indicates an array of objects.  There are two containers defined in an array of containers.</a:t>
+            </a:r>
+          </a:p>
+        </p:txBody>
+      </p:sp>
+      <p:sp>
+        <p:nvSpPr>
+          <p:cNvPr id="15" name="TextBox 14">
+            <a:extLst>
+              <a:ext uri="{FF2B5EF4-FFF2-40B4-BE49-F238E27FC236}">
+                <a16:creationId xmlns:a16="http://schemas.microsoft.com/office/drawing/2014/main" id="{C4141EC1-666B-714D-8155-B6E9CA5ADC29}"/>
+              </a:ext>
+            </a:extLst>
+          </p:cNvPr>
+          <p:cNvSpPr txBox="1"/>
+          <p:nvPr/>
+        </p:nvSpPr>
+        <p:spPr>
+          <a:xfrm>
+            <a:off x="4422635" y="286327"/>
+            <a:ext cx="7381438" cy="707886"/>
+          </a:xfrm>
+          <a:prstGeom prst="rect">
+            <a:avLst/>
+          </a:prstGeom>
+          <a:noFill/>
+        </p:spPr>
+        <p:txBody>
+          <a:bodyPr wrap="square" rtlCol="0">
+            <a:spAutoFit/>
+          </a:bodyPr>
+          <a:lstStyle/>
+          <a:p>
+            <a:pPr algn="ctr"/>
+            <a:r>
+              <a:rPr lang="en-US" sz="2000" dirty="0"/>
+              <a:t>YAML is a format, and we use it to declare how Kubernetes will create our pod</a:t>
+            </a:r>
+          </a:p>
+        </p:txBody>
+      </p:sp>
+      <p:pic>
+        <p:nvPicPr>
+          <p:cNvPr id="18" name="Picture 17" descr="Text&#10;&#10;Description automatically generated">
+            <a:extLst>
+              <a:ext uri="{FF2B5EF4-FFF2-40B4-BE49-F238E27FC236}">
+                <a16:creationId xmlns:a16="http://schemas.microsoft.com/office/drawing/2014/main" id="{2B00D949-C517-AD4B-839C-1013BBB5471A}"/>
+              </a:ext>
+            </a:extLst>
+          </p:cNvPr>
+          <p:cNvPicPr>
+            <a:picLocks noChangeAspect="1"/>
+          </p:cNvPicPr>
+          <p:nvPr/>
+        </p:nvPicPr>
+        <p:blipFill>
+          <a:blip r:embed="rId4"/>
+          <a:stretch>
+            <a:fillRect/>
+          </a:stretch>
+        </p:blipFill>
+        <p:spPr>
+          <a:xfrm>
+            <a:off x="4422635" y="1034319"/>
+            <a:ext cx="3788492" cy="3788492"/>
+          </a:xfrm>
+          <a:prstGeom prst="rect">
+            <a:avLst/>
+          </a:prstGeom>
+        </p:spPr>
+      </p:pic>
+      <p:sp>
+        <p:nvSpPr>
+          <p:cNvPr id="19" name="Frame 18">
+            <a:extLst>
+              <a:ext uri="{FF2B5EF4-FFF2-40B4-BE49-F238E27FC236}">
+                <a16:creationId xmlns:a16="http://schemas.microsoft.com/office/drawing/2014/main" id="{4B7137CE-B4C3-4F45-AA29-EE6B2CB4DB5C}"/>
+              </a:ext>
+            </a:extLst>
+          </p:cNvPr>
+          <p:cNvSpPr/>
+          <p:nvPr/>
+        </p:nvSpPr>
+        <p:spPr>
+          <a:xfrm>
+            <a:off x="4422635" y="1034319"/>
+            <a:ext cx="1747256" cy="311071"/>
+          </a:xfrm>
+          <a:prstGeom prst="frame">
+            <a:avLst/>
+          </a:prstGeom>
+        </p:spPr>
+        <p:style>
+          <a:lnRef idx="2">
+            <a:schemeClr val="accent1">
+              <a:shade val="50000"/>
+            </a:schemeClr>
+          </a:lnRef>
+          <a:fillRef idx="1">
+            <a:schemeClr val="accent1"/>
+          </a:fillRef>
+          <a:effectRef idx="0">
+            <a:schemeClr val="accent1"/>
+          </a:effectRef>
+          <a:fontRef idx="minor">
+            <a:schemeClr val="lt1"/>
+          </a:fontRef>
+        </p:style>
+        <p:txBody>
+          <a:bodyPr rtlCol="0" anchor="ctr"/>
+          <a:lstStyle/>
+          <a:p>
+            <a:pPr algn="ctr"/>
+            <a:endParaRPr lang="en-US">
+              <a:solidFill>
+                <a:schemeClr val="tx1"/>
+              </a:solidFill>
+            </a:endParaRPr>
+          </a:p>
+        </p:txBody>
+      </p:sp>
+      <p:sp>
+        <p:nvSpPr>
+          <p:cNvPr id="32" name="Frame 31">
+            <a:extLst>
+              <a:ext uri="{FF2B5EF4-FFF2-40B4-BE49-F238E27FC236}">
+                <a16:creationId xmlns:a16="http://schemas.microsoft.com/office/drawing/2014/main" id="{58CC6BB0-1B95-894C-A360-327B8D1D4004}"/>
+              </a:ext>
+            </a:extLst>
+          </p:cNvPr>
+          <p:cNvSpPr/>
+          <p:nvPr/>
+        </p:nvSpPr>
+        <p:spPr>
+          <a:xfrm>
+            <a:off x="4422635" y="1345390"/>
+            <a:ext cx="1747256" cy="280131"/>
+          </a:xfrm>
+          <a:prstGeom prst="frame">
+            <a:avLst/>
+          </a:prstGeom>
+        </p:spPr>
+        <p:style>
+          <a:lnRef idx="2">
+            <a:schemeClr val="accent1">
+              <a:shade val="50000"/>
+            </a:schemeClr>
+          </a:lnRef>
+          <a:fillRef idx="1">
+            <a:schemeClr val="accent1"/>
+          </a:fillRef>
+          <a:effectRef idx="0">
+            <a:schemeClr val="accent1"/>
+          </a:effectRef>
+          <a:fontRef idx="minor">
+            <a:schemeClr val="lt1"/>
+          </a:fontRef>
+        </p:style>
+        <p:txBody>
+          <a:bodyPr rtlCol="0" anchor="ctr"/>
+          <a:lstStyle/>
+          <a:p>
+            <a:pPr algn="ctr"/>
+            <a:endParaRPr lang="en-US">
+              <a:solidFill>
+                <a:schemeClr val="tx1"/>
+              </a:solidFill>
+            </a:endParaRPr>
+          </a:p>
+        </p:txBody>
+      </p:sp>
+      <p:sp>
+        <p:nvSpPr>
+          <p:cNvPr id="37" name="Frame 36">
+            <a:extLst>
+              <a:ext uri="{FF2B5EF4-FFF2-40B4-BE49-F238E27FC236}">
+                <a16:creationId xmlns:a16="http://schemas.microsoft.com/office/drawing/2014/main" id="{F5A1861F-CD3C-9749-89EA-173C1FA98B4A}"/>
+              </a:ext>
+            </a:extLst>
+          </p:cNvPr>
+          <p:cNvSpPr/>
+          <p:nvPr/>
+        </p:nvSpPr>
+        <p:spPr>
+          <a:xfrm>
+            <a:off x="4422635" y="1656461"/>
+            <a:ext cx="1747256" cy="280131"/>
+          </a:xfrm>
+          <a:prstGeom prst="frame">
+            <a:avLst/>
+          </a:prstGeom>
+        </p:spPr>
+        <p:style>
+          <a:lnRef idx="2">
+            <a:schemeClr val="accent1">
+              <a:shade val="50000"/>
+            </a:schemeClr>
+          </a:lnRef>
+          <a:fillRef idx="1">
+            <a:schemeClr val="accent1"/>
+          </a:fillRef>
+          <a:effectRef idx="0">
+            <a:schemeClr val="accent1"/>
+          </a:effectRef>
+          <a:fontRef idx="minor">
+            <a:schemeClr val="lt1"/>
+          </a:fontRef>
+        </p:style>
+        <p:txBody>
+          <a:bodyPr rtlCol="0" anchor="ctr"/>
+          <a:lstStyle/>
+          <a:p>
+            <a:pPr algn="ctr"/>
+            <a:endParaRPr lang="en-US">
+              <a:solidFill>
+                <a:schemeClr val="tx1"/>
+              </a:solidFill>
+            </a:endParaRPr>
+          </a:p>
+        </p:txBody>
+      </p:sp>
+      <p:sp>
+        <p:nvSpPr>
+          <p:cNvPr id="38" name="Frame 37">
+            <a:extLst>
+              <a:ext uri="{FF2B5EF4-FFF2-40B4-BE49-F238E27FC236}">
+                <a16:creationId xmlns:a16="http://schemas.microsoft.com/office/drawing/2014/main" id="{DE1B4445-BF76-AA4D-873D-D2E6451628ED}"/>
+              </a:ext>
+            </a:extLst>
+          </p:cNvPr>
+          <p:cNvSpPr/>
+          <p:nvPr/>
+        </p:nvSpPr>
+        <p:spPr>
+          <a:xfrm>
+            <a:off x="4422635" y="2874441"/>
+            <a:ext cx="1747256" cy="280131"/>
+          </a:xfrm>
+          <a:prstGeom prst="frame">
+            <a:avLst/>
+          </a:prstGeom>
+        </p:spPr>
+        <p:style>
+          <a:lnRef idx="2">
+            <a:schemeClr val="accent1">
+              <a:shade val="50000"/>
+            </a:schemeClr>
+          </a:lnRef>
+          <a:fillRef idx="1">
+            <a:schemeClr val="accent1"/>
+          </a:fillRef>
+          <a:effectRef idx="0">
+            <a:schemeClr val="accent1"/>
+          </a:effectRef>
+          <a:fontRef idx="minor">
+            <a:schemeClr val="lt1"/>
+          </a:fontRef>
+        </p:style>
+        <p:txBody>
+          <a:bodyPr rtlCol="0" anchor="ctr"/>
+          <a:lstStyle/>
+          <a:p>
+            <a:pPr algn="ctr"/>
+            <a:endParaRPr lang="en-US">
+              <a:solidFill>
+                <a:schemeClr val="tx1"/>
+              </a:solidFill>
+            </a:endParaRPr>
+          </a:p>
+        </p:txBody>
+      </p:sp>
     </p:spTree>
     <p:extLst>
       <p:ext uri="{BB962C8B-B14F-4D97-AF65-F5344CB8AC3E}">
@@ -16355,4 +14074,299 @@
     </a:ext>
   </a:extLst>
 </a:theme>
+</file>
+
+<file path=ppt/theme/theme2.xml><?xml version="1.0" encoding="utf-8"?>
+<a:theme xmlns:a="http://schemas.openxmlformats.org/drawingml/2006/main" name="Office Theme">
+  <a:themeElements>
+    <a:clrScheme name="Office">
+      <a:dk1>
+        <a:sysClr val="windowText" lastClr="000000"/>
+      </a:dk1>
+      <a:lt1>
+        <a:sysClr val="window" lastClr="FFFFFF"/>
+      </a:lt1>
+      <a:dk2>
+        <a:srgbClr val="44546A"/>
+      </a:dk2>
+      <a:lt2>
+        <a:srgbClr val="E7E6E6"/>
+      </a:lt2>
+      <a:accent1>
+        <a:srgbClr val="4472C4"/>
+      </a:accent1>
+      <a:accent2>
+        <a:srgbClr val="ED7D31"/>
+      </a:accent2>
+      <a:accent3>
+        <a:srgbClr val="A5A5A5"/>
+      </a:accent3>
+      <a:accent4>
+        <a:srgbClr val="FFC000"/>
+      </a:accent4>
+      <a:accent5>
+        <a:srgbClr val="5B9BD5"/>
+      </a:accent5>
+      <a:accent6>
+        <a:srgbClr val="70AD47"/>
+      </a:accent6>
+      <a:hlink>
+        <a:srgbClr val="0563C1"/>
+      </a:hlink>
+      <a:folHlink>
+        <a:srgbClr val="954F72"/>
+      </a:folHlink>
+    </a:clrScheme>
+    <a:fontScheme name="Office">
+      <a:majorFont>
+        <a:latin typeface="Calibri Light" panose="020F0302020204030204"/>
+        <a:ea typeface=""/>
+        <a:cs typeface=""/>
+        <a:font script="Jpan" typeface="游ゴシック Light"/>
+        <a:font script="Hang" typeface="맑은 고딕"/>
+        <a:font script="Hans" typeface="等线 Light"/>
+        <a:font script="Hant" typeface="新細明體"/>
+        <a:font script="Arab" typeface="Times New Roman"/>
+        <a:font script="Hebr" typeface="Times New Roman"/>
+        <a:font script="Thai" typeface="Angsana New"/>
+        <a:font script="Ethi" typeface="Nyala"/>
+        <a:font script="Beng" typeface="Vrinda"/>
+        <a:font script="Gujr" typeface="Shruti"/>
+        <a:font script="Khmr" typeface="MoolBoran"/>
+        <a:font script="Knda" typeface="Tunga"/>
+        <a:font script="Guru" typeface="Raavi"/>
+        <a:font script="Cans" typeface="Euphemia"/>
+        <a:font script="Cher" typeface="Plantagenet Cherokee"/>
+        <a:font script="Yiii" typeface="Microsoft Yi Baiti"/>
+        <a:font script="Tibt" typeface="Microsoft Himalaya"/>
+        <a:font script="Thaa" typeface="MV Boli"/>
+        <a:font script="Deva" typeface="Mangal"/>
+        <a:font script="Telu" typeface="Gautami"/>
+        <a:font script="Taml" typeface="Latha"/>
+        <a:font script="Syrc" typeface="Estrangelo Edessa"/>
+        <a:font script="Orya" typeface="Kalinga"/>
+        <a:font script="Mlym" typeface="Kartika"/>
+        <a:font script="Laoo" typeface="DokChampa"/>
+        <a:font script="Sinh" typeface="Iskoola Pota"/>
+        <a:font script="Mong" typeface="Mongolian Baiti"/>
+        <a:font script="Viet" typeface="Times New Roman"/>
+        <a:font script="Uigh" typeface="Microsoft Uighur"/>
+        <a:font script="Geor" typeface="Sylfaen"/>
+        <a:font script="Armn" typeface="Arial"/>
+        <a:font script="Bugi" typeface="Leelawadee UI"/>
+        <a:font script="Bopo" typeface="Microsoft JhengHei"/>
+        <a:font script="Java" typeface="Javanese Text"/>
+        <a:font script="Lisu" typeface="Segoe UI"/>
+        <a:font script="Mymr" typeface="Myanmar Text"/>
+        <a:font script="Nkoo" typeface="Ebrima"/>
+        <a:font script="Olck" typeface="Nirmala UI"/>
+        <a:font script="Osma" typeface="Ebrima"/>
+        <a:font script="Phag" typeface="Phagspa"/>
+        <a:font script="Syrn" typeface="Estrangelo Edessa"/>
+        <a:font script="Syrj" typeface="Estrangelo Edessa"/>
+        <a:font script="Syre" typeface="Estrangelo Edessa"/>
+        <a:font script="Sora" typeface="Nirmala UI"/>
+        <a:font script="Tale" typeface="Microsoft Tai Le"/>
+        <a:font script="Talu" typeface="Microsoft New Tai Lue"/>
+        <a:font script="Tfng" typeface="Ebrima"/>
+      </a:majorFont>
+      <a:minorFont>
+        <a:latin typeface="Calibri" panose="020F0502020204030204"/>
+        <a:ea typeface=""/>
+        <a:cs typeface=""/>
+        <a:font script="Jpan" typeface="游ゴシック"/>
+        <a:font script="Hang" typeface="맑은 고딕"/>
+        <a:font script="Hans" typeface="等线"/>
+        <a:font script="Hant" typeface="新細明體"/>
+        <a:font script="Arab" typeface="Arial"/>
+        <a:font script="Hebr" typeface="Arial"/>
+        <a:font script="Thai" typeface="Cordia New"/>
+        <a:font script="Ethi" typeface="Nyala"/>
+        <a:font script="Beng" typeface="Vrinda"/>
+        <a:font script="Gujr" typeface="Shruti"/>
+        <a:font script="Khmr" typeface="DaunPenh"/>
+        <a:font script="Knda" typeface="Tunga"/>
+        <a:font script="Guru" typeface="Raavi"/>
+        <a:font script="Cans" typeface="Euphemia"/>
+        <a:font script="Cher" typeface="Plantagenet Cherokee"/>
+        <a:font script="Yiii" typeface="Microsoft Yi Baiti"/>
+        <a:font script="Tibt" typeface="Microsoft Himalaya"/>
+        <a:font script="Thaa" typeface="MV Boli"/>
+        <a:font script="Deva" typeface="Mangal"/>
+        <a:font script="Telu" typeface="Gautami"/>
+        <a:font script="Taml" typeface="Latha"/>
+        <a:font script="Syrc" typeface="Estrangelo Edessa"/>
+        <a:font script="Orya" typeface="Kalinga"/>
+        <a:font script="Mlym" typeface="Kartika"/>
+        <a:font script="Laoo" typeface="DokChampa"/>
+        <a:font script="Sinh" typeface="Iskoola Pota"/>
+        <a:font script="Mong" typeface="Mongolian Baiti"/>
+        <a:font script="Viet" typeface="Arial"/>
+        <a:font script="Uigh" typeface="Microsoft Uighur"/>
+        <a:font script="Geor" typeface="Sylfaen"/>
+        <a:font script="Armn" typeface="Arial"/>
+        <a:font script="Bugi" typeface="Leelawadee UI"/>
+        <a:font script="Bopo" typeface="Microsoft JhengHei"/>
+        <a:font script="Java" typeface="Javanese Text"/>
+        <a:font script="Lisu" typeface="Segoe UI"/>
+        <a:font script="Mymr" typeface="Myanmar Text"/>
+        <a:font script="Nkoo" typeface="Ebrima"/>
+        <a:font script="Olck" typeface="Nirmala UI"/>
+        <a:font script="Osma" typeface="Ebrima"/>
+        <a:font script="Phag" typeface="Phagspa"/>
+        <a:font script="Syrn" typeface="Estrangelo Edessa"/>
+        <a:font script="Syrj" typeface="Estrangelo Edessa"/>
+        <a:font script="Syre" typeface="Estrangelo Edessa"/>
+        <a:font script="Sora" typeface="Nirmala UI"/>
+        <a:font script="Tale" typeface="Microsoft Tai Le"/>
+        <a:font script="Talu" typeface="Microsoft New Tai Lue"/>
+        <a:font script="Tfng" typeface="Ebrima"/>
+      </a:minorFont>
+    </a:fontScheme>
+    <a:fmtScheme name="Office">
+      <a:fillStyleLst>
+        <a:solidFill>
+          <a:schemeClr val="phClr"/>
+        </a:solidFill>
+        <a:gradFill rotWithShape="1">
+          <a:gsLst>
+            <a:gs pos="0">
+              <a:schemeClr val="phClr">
+                <a:lumMod val="110000"/>
+                <a:satMod val="105000"/>
+                <a:tint val="67000"/>
+              </a:schemeClr>
+            </a:gs>
+            <a:gs pos="50000">
+              <a:schemeClr val="phClr">
+                <a:lumMod val="105000"/>
+                <a:satMod val="103000"/>
+                <a:tint val="73000"/>
+              </a:schemeClr>
+            </a:gs>
+            <a:gs pos="100000">
+              <a:schemeClr val="phClr">
+                <a:lumMod val="105000"/>
+                <a:satMod val="109000"/>
+                <a:tint val="81000"/>
+              </a:schemeClr>
+            </a:gs>
+          </a:gsLst>
+          <a:lin ang="5400000" scaled="0"/>
+        </a:gradFill>
+        <a:gradFill rotWithShape="1">
+          <a:gsLst>
+            <a:gs pos="0">
+              <a:schemeClr val="phClr">
+                <a:satMod val="103000"/>
+                <a:lumMod val="102000"/>
+                <a:tint val="94000"/>
+              </a:schemeClr>
+            </a:gs>
+            <a:gs pos="50000">
+              <a:schemeClr val="phClr">
+                <a:satMod val="110000"/>
+                <a:lumMod val="100000"/>
+                <a:shade val="100000"/>
+              </a:schemeClr>
+            </a:gs>
+            <a:gs pos="100000">
+              <a:schemeClr val="phClr">
+                <a:lumMod val="99000"/>
+                <a:satMod val="120000"/>
+                <a:shade val="78000"/>
+              </a:schemeClr>
+            </a:gs>
+          </a:gsLst>
+          <a:lin ang="5400000" scaled="0"/>
+        </a:gradFill>
+      </a:fillStyleLst>
+      <a:lnStyleLst>
+        <a:ln w="6350" cap="flat" cmpd="sng" algn="ctr">
+          <a:solidFill>
+            <a:schemeClr val="phClr"/>
+          </a:solidFill>
+          <a:prstDash val="solid"/>
+          <a:miter lim="800000"/>
+        </a:ln>
+        <a:ln w="12700" cap="flat" cmpd="sng" algn="ctr">
+          <a:solidFill>
+            <a:schemeClr val="phClr"/>
+          </a:solidFill>
+          <a:prstDash val="solid"/>
+          <a:miter lim="800000"/>
+        </a:ln>
+        <a:ln w="19050" cap="flat" cmpd="sng" algn="ctr">
+          <a:solidFill>
+            <a:schemeClr val="phClr"/>
+          </a:solidFill>
+          <a:prstDash val="solid"/>
+          <a:miter lim="800000"/>
+        </a:ln>
+      </a:lnStyleLst>
+      <a:effectStyleLst>
+        <a:effectStyle>
+          <a:effectLst/>
+        </a:effectStyle>
+        <a:effectStyle>
+          <a:effectLst/>
+        </a:effectStyle>
+        <a:effectStyle>
+          <a:effectLst>
+            <a:outerShdw blurRad="57150" dist="19050" dir="5400000" algn="ctr" rotWithShape="0">
+              <a:srgbClr val="000000">
+                <a:alpha val="63000"/>
+              </a:srgbClr>
+            </a:outerShdw>
+          </a:effectLst>
+        </a:effectStyle>
+      </a:effectStyleLst>
+      <a:bgFillStyleLst>
+        <a:solidFill>
+          <a:schemeClr val="phClr"/>
+        </a:solidFill>
+        <a:solidFill>
+          <a:schemeClr val="phClr">
+            <a:tint val="95000"/>
+            <a:satMod val="170000"/>
+          </a:schemeClr>
+        </a:solidFill>
+        <a:gradFill rotWithShape="1">
+          <a:gsLst>
+            <a:gs pos="0">
+              <a:schemeClr val="phClr">
+                <a:tint val="93000"/>
+                <a:satMod val="150000"/>
+                <a:shade val="98000"/>
+                <a:lumMod val="102000"/>
+              </a:schemeClr>
+            </a:gs>
+            <a:gs pos="50000">
+              <a:schemeClr val="phClr">
+                <a:tint val="98000"/>
+                <a:satMod val="130000"/>
+                <a:shade val="90000"/>
+                <a:lumMod val="103000"/>
+              </a:schemeClr>
+            </a:gs>
+            <a:gs pos="100000">
+              <a:schemeClr val="phClr">
+                <a:shade val="63000"/>
+                <a:satMod val="120000"/>
+              </a:schemeClr>
+            </a:gs>
+          </a:gsLst>
+          <a:lin ang="5400000" scaled="0"/>
+        </a:gradFill>
+      </a:bgFillStyleLst>
+    </a:fmtScheme>
+  </a:themeElements>
+  <a:objectDefaults/>
+  <a:extraClrSchemeLst/>
+  <a:extLst>
+    <a:ext uri="{05A4C25C-085E-4340-85A3-A5531E510DB2}">
+      <thm15:themeFamily xmlns:thm15="http://schemas.microsoft.com/office/thememl/2012/main" name="Office Theme" id="{62F939B6-93AF-4DB8-9C6B-D6C7DFDC589F}" vid="{4A3C46E8-61CC-4603-A589-7422A47A8E4A}"/>
+    </a:ext>
+  </a:extLst>
+</a:theme>
 </file>
</xml_diff>